<commit_message>
fixed a typo and added a PDF with notes.
</commit_message>
<xml_diff>
--- a/ja/publication/presentation/groonga-night-2-the-future.pptx
+++ b/ja/publication/presentation/groonga-night-2-the-future.pptx
@@ -163,8 +163,8 @@
           <c:yMode val="edge"/>
           <c:x val="0.1485095265869544"/>
           <c:y val="5.5131471468061112E-2"/>
-          <c:w val="0.61399047341304835"/>
-          <c:h val="0.71476457054554032"/>
+          <c:w val="0.61399047341304891"/>
+          <c:h val="0.71476457054554055"/>
         </c:manualLayout>
       </c:layout>
       <c:scatterChart>
@@ -283,7 +283,7 @@
                 <c:formatCode>General</c:formatCode>
                 <c:ptCount val="28"/>
                 <c:pt idx="0">
-                  <c:v>0.37541400000000064</c:v>
+                  <c:v>0.37541400000000086</c:v>
                 </c:pt>
                 <c:pt idx="1">
                   <c:v>0.40710000000000002</c:v>
@@ -313,7 +313,7 @@
                   <c:v>0.57179899999999995</c:v>
                 </c:pt>
                 <c:pt idx="10">
-                  <c:v>0.6711960000000009</c:v>
+                  <c:v>0.67119600000000113</c:v>
                 </c:pt>
                 <c:pt idx="11">
                   <c:v>0.70309600000000005</c:v>
@@ -322,7 +322,7 @@
                   <c:v>0.78449199999999997</c:v>
                 </c:pt>
                 <c:pt idx="13">
-                  <c:v>0.84369200000000077</c:v>
+                  <c:v>0.843692000000001</c:v>
                 </c:pt>
                 <c:pt idx="14">
                   <c:v>0.83088899999999999</c:v>
@@ -331,7 +331,7 @@
                   <c:v>0.94618800000000003</c:v>
                 </c:pt>
                 <c:pt idx="16">
-                  <c:v>0.89919600000000077</c:v>
+                  <c:v>0.89919600000000099</c:v>
                 </c:pt>
                 <c:pt idx="17">
                   <c:v>1.0157109999999998</c:v>
@@ -343,10 +343,10 @@
                   <c:v>1.1936899999999999</c:v>
                 </c:pt>
                 <c:pt idx="20">
-                  <c:v>1.3494969999999984</c:v>
+                  <c:v>1.3494969999999979</c:v>
                 </c:pt>
                 <c:pt idx="21">
-                  <c:v>1.4549969999999985</c:v>
+                  <c:v>1.4549969999999977</c:v>
                 </c:pt>
                 <c:pt idx="22">
                   <c:v>1.5376089999999998</c:v>
@@ -355,7 +355,7 @@
                   <c:v>1.595092</c:v>
                 </c:pt>
                 <c:pt idx="24">
-                  <c:v>1.6758919999999984</c:v>
+                  <c:v>1.6758919999999979</c:v>
                 </c:pt>
                 <c:pt idx="25">
                   <c:v>1.7090080000000001</c:v>
@@ -364,7 +364,7 @@
                   <c:v>1.7350909999999999</c:v>
                 </c:pt>
                 <c:pt idx="27">
-                  <c:v>1.7598870000000015</c:v>
+                  <c:v>1.7598870000000022</c:v>
                 </c:pt>
               </c:numCache>
             </c:numRef>
@@ -490,31 +490,31 @@
                   <c:v>0.15468599999999999</c:v>
                 </c:pt>
                 <c:pt idx="2">
-                  <c:v>0.16689300000000029</c:v>
+                  <c:v>0.16689300000000037</c:v>
                 </c:pt>
                 <c:pt idx="3">
-                  <c:v>0.15540100000000029</c:v>
+                  <c:v>0.15540100000000037</c:v>
                 </c:pt>
                 <c:pt idx="4">
-                  <c:v>0.15921600000000038</c:v>
+                  <c:v>0.15921600000000047</c:v>
                 </c:pt>
                 <c:pt idx="5">
                   <c:v>0.17600099999999999</c:v>
                 </c:pt>
                 <c:pt idx="6">
-                  <c:v>0.19948500000000038</c:v>
+                  <c:v>0.19948500000000047</c:v>
                 </c:pt>
                 <c:pt idx="7">
                   <c:v>0.21068999999999999</c:v>
                 </c:pt>
                 <c:pt idx="8">
-                  <c:v>0.19919900000000026</c:v>
+                  <c:v>0.19919900000000032</c:v>
                 </c:pt>
                 <c:pt idx="9">
-                  <c:v>0.19750600000000026</c:v>
+                  <c:v>0.19750600000000032</c:v>
                 </c:pt>
                 <c:pt idx="10">
-                  <c:v>0.27830600000000039</c:v>
+                  <c:v>0.2783060000000005</c:v>
                 </c:pt>
                 <c:pt idx="11">
                   <c:v>0.35250200000000032</c:v>
@@ -523,7 +523,7 @@
                   <c:v>0.39699100000000032</c:v>
                 </c:pt>
                 <c:pt idx="13">
-                  <c:v>0.43048900000000045</c:v>
+                  <c:v>0.43048900000000057</c:v>
                 </c:pt>
                 <c:pt idx="14">
                   <c:v>0.45130300000000001</c:v>
@@ -535,16 +535,16 @@
                   <c:v>0.50509000000000004</c:v>
                 </c:pt>
                 <c:pt idx="17">
-                  <c:v>0.55789900000000103</c:v>
+                  <c:v>0.55789900000000126</c:v>
                 </c:pt>
                 <c:pt idx="18">
                   <c:v>0.50909499999999996</c:v>
                 </c:pt>
                 <c:pt idx="19">
-                  <c:v>0.60532100000000078</c:v>
+                  <c:v>0.605321000000001</c:v>
                 </c:pt>
                 <c:pt idx="20">
-                  <c:v>0.6494050000000009</c:v>
+                  <c:v>0.64940500000000112</c:v>
                 </c:pt>
                 <c:pt idx="21">
                   <c:v>0.73168299999999997</c:v>
@@ -553,19 +553,19 @@
                   <c:v>0.72569799999999995</c:v>
                 </c:pt>
                 <c:pt idx="23">
-                  <c:v>0.70509900000000103</c:v>
+                  <c:v>0.70509900000000125</c:v>
                 </c:pt>
                 <c:pt idx="24">
                   <c:v>0.75180499999999995</c:v>
                 </c:pt>
                 <c:pt idx="25">
-                  <c:v>0.7439850000000009</c:v>
+                  <c:v>0.74398500000000112</c:v>
                 </c:pt>
                 <c:pt idx="26">
                   <c:v>0.74529600000000062</c:v>
                 </c:pt>
                 <c:pt idx="27">
-                  <c:v>0.81179100000000104</c:v>
+                  <c:v>0.81179100000000126</c:v>
                 </c:pt>
               </c:numCache>
             </c:numRef>
@@ -685,22 +685,22 @@
                 <c:formatCode>General</c:formatCode>
                 <c:ptCount val="28"/>
                 <c:pt idx="0">
-                  <c:v>0.14581700000000022</c:v>
+                  <c:v>0.14581700000000028</c:v>
                 </c:pt>
                 <c:pt idx="1">
-                  <c:v>0.16989700000000033</c:v>
+                  <c:v>0.16989700000000044</c:v>
                 </c:pt>
                 <c:pt idx="2">
-                  <c:v>0.16999200000000045</c:v>
+                  <c:v>0.16999200000000056</c:v>
                 </c:pt>
                 <c:pt idx="3">
-                  <c:v>0.17859900000000026</c:v>
+                  <c:v>0.17859900000000031</c:v>
                 </c:pt>
                 <c:pt idx="4">
-                  <c:v>0.18000600000000022</c:v>
+                  <c:v>0.18000600000000028</c:v>
                 </c:pt>
                 <c:pt idx="5">
-                  <c:v>0.19099700000000042</c:v>
+                  <c:v>0.19099700000000053</c:v>
                 </c:pt>
                 <c:pt idx="6">
                   <c:v>0.20000899999999999</c:v>
@@ -709,16 +709,16 @@
                   <c:v>0.21460099999999999</c:v>
                 </c:pt>
                 <c:pt idx="8">
-                  <c:v>0.22170500000000029</c:v>
+                  <c:v>0.22170500000000037</c:v>
                 </c:pt>
                 <c:pt idx="9">
-                  <c:v>0.23798900000000026</c:v>
+                  <c:v>0.23798900000000031</c:v>
                 </c:pt>
                 <c:pt idx="10">
                   <c:v>0.31161300000000008</c:v>
                 </c:pt>
                 <c:pt idx="11">
-                  <c:v>0.31681100000000045</c:v>
+                  <c:v>0.31681100000000056</c:v>
                 </c:pt>
                 <c:pt idx="12">
                   <c:v>0.43439900000000031</c:v>
@@ -754,7 +754,7 @@
                   <c:v>1.0312079999999999</c:v>
                 </c:pt>
                 <c:pt idx="23">
-                  <c:v>1.0613919999999983</c:v>
+                  <c:v>1.0613919999999977</c:v>
                 </c:pt>
                 <c:pt idx="24">
                   <c:v>1.0696889999999999</c:v>
@@ -772,11 +772,11 @@
             </c:numRef>
           </c:yVal>
         </c:ser>
-        <c:axId val="131760512"/>
-        <c:axId val="131762432"/>
+        <c:axId val="144288000"/>
+        <c:axId val="142614912"/>
       </c:scatterChart>
       <c:valAx>
-        <c:axId val="131760512"/>
+        <c:axId val="144288000"/>
         <c:scaling>
           <c:logBase val="10"/>
           <c:orientation val="minMax"/>
@@ -800,7 +800,6 @@
               </a:p>
             </c:rich>
           </c:tx>
-          <c:layout/>
         </c:title>
         <c:numFmt formatCode="#,##0_);\(#,##0\)" sourceLinked="0"/>
         <c:tickLblPos val="nextTo"/>
@@ -814,12 +813,12 @@
             <a:endParaRPr lang="ja-JP"/>
           </a:p>
         </c:txPr>
-        <c:crossAx val="131762432"/>
+        <c:crossAx val="142614912"/>
         <c:crosses val="autoZero"/>
         <c:crossBetween val="midCat"/>
       </c:valAx>
       <c:valAx>
-        <c:axId val="131762432"/>
+        <c:axId val="142614912"/>
         <c:scaling>
           <c:orientation val="minMax"/>
         </c:scaling>
@@ -854,7 +853,6 @@
               </a:p>
             </c:rich>
           </c:tx>
-          <c:layout/>
         </c:title>
         <c:numFmt formatCode="General" sourceLinked="0"/>
         <c:tickLblPos val="nextTo"/>
@@ -868,14 +866,13 @@
             <a:endParaRPr lang="ja-JP"/>
           </a:p>
         </c:txPr>
-        <c:crossAx val="131760512"/>
+        <c:crossAx val="144288000"/>
         <c:crosses val="autoZero"/>
         <c:crossBetween val="midCat"/>
       </c:valAx>
     </c:plotArea>
     <c:legend>
       <c:legendPos val="r"/>
-      <c:layout/>
       <c:txPr>
         <a:bodyPr/>
         <a:lstStyle/>
@@ -916,8 +913,8 @@
           <c:yMode val="edge"/>
           <c:x val="0.1485095265869544"/>
           <c:y val="5.5131471468061063E-2"/>
-          <c:w val="0.61399047341304891"/>
-          <c:h val="0.71476457054554055"/>
+          <c:w val="0.61399047341304935"/>
+          <c:h val="0.71476457054554077"/>
         </c:manualLayout>
       </c:layout>
       <c:scatterChart>
@@ -1036,7 +1033,7 @@
                 <c:formatCode>General</c:formatCode>
                 <c:ptCount val="28"/>
                 <c:pt idx="0">
-                  <c:v>0.39100600000000052</c:v>
+                  <c:v>0.39100600000000063</c:v>
                 </c:pt>
                 <c:pt idx="1">
                   <c:v>0.422597</c:v>
@@ -1069,10 +1066,10 @@
                   <c:v>0.50181199999999959</c:v>
                 </c:pt>
                 <c:pt idx="11">
-                  <c:v>0.49086400000000052</c:v>
+                  <c:v>0.49086400000000063</c:v>
                 </c:pt>
                 <c:pt idx="12">
-                  <c:v>0.49237000000000053</c:v>
+                  <c:v>0.49237000000000075</c:v>
                 </c:pt>
                 <c:pt idx="13">
                   <c:v>0.48800000000000032</c:v>
@@ -1081,19 +1078,19 @@
                   <c:v>0.49154400000000031</c:v>
                 </c:pt>
                 <c:pt idx="15">
-                  <c:v>0.49698700000000046</c:v>
+                  <c:v>0.49698700000000057</c:v>
                 </c:pt>
                 <c:pt idx="16">
                   <c:v>0.4967390000000001</c:v>
                 </c:pt>
                 <c:pt idx="17">
-                  <c:v>0.50391399999999908</c:v>
+                  <c:v>0.50391399999999886</c:v>
                 </c:pt>
                 <c:pt idx="18">
                   <c:v>0.50076500000000002</c:v>
                 </c:pt>
                 <c:pt idx="19">
-                  <c:v>0.57309900000000102</c:v>
+                  <c:v>0.57309900000000125</c:v>
                 </c:pt>
                 <c:pt idx="20">
                   <c:v>0.63900600000000063</c:v>
@@ -1246,7 +1243,7 @@
                   <c:v>1.4410809999999998</c:v>
                 </c:pt>
                 <c:pt idx="3">
-                  <c:v>1.1842850000000018</c:v>
+                  <c:v>1.1842850000000025</c:v>
                 </c:pt>
                 <c:pt idx="4">
                   <c:v>1.0293959999999998</c:v>
@@ -1255,7 +1252,7 @@
                   <c:v>0.91950100000000001</c:v>
                 </c:pt>
                 <c:pt idx="6">
-                  <c:v>0.84216299999999922</c:v>
+                  <c:v>0.842162999999999</c:v>
                 </c:pt>
                 <c:pt idx="7">
                   <c:v>0.78391999999999951</c:v>
@@ -1276,7 +1273,7 @@
                   <c:v>0.352663</c:v>
                 </c:pt>
                 <c:pt idx="13">
-                  <c:v>0.32933200000000046</c:v>
+                  <c:v>0.32933200000000057</c:v>
                 </c:pt>
                 <c:pt idx="14">
                   <c:v>0.31734700000000032</c:v>
@@ -1300,16 +1297,16 @@
                   <c:v>0.298707</c:v>
                 </c:pt>
                 <c:pt idx="21">
-                  <c:v>0.31312200000000046</c:v>
+                  <c:v>0.31312200000000057</c:v>
                 </c:pt>
                 <c:pt idx="22">
-                  <c:v>0.33010800000000046</c:v>
+                  <c:v>0.33010800000000057</c:v>
                 </c:pt>
                 <c:pt idx="23">
                   <c:v>0.49149300000000001</c:v>
                 </c:pt>
                 <c:pt idx="24">
-                  <c:v>0.47131600000000046</c:v>
+                  <c:v>0.47131600000000057</c:v>
                 </c:pt>
                 <c:pt idx="25">
                   <c:v>0.45779799999999998</c:v>
@@ -1441,16 +1438,16 @@
                   <c:v>0.64206099999999999</c:v>
                 </c:pt>
                 <c:pt idx="1">
-                  <c:v>0.6740090000000013</c:v>
+                  <c:v>0.67400900000000175</c:v>
                 </c:pt>
                 <c:pt idx="2">
                   <c:v>0.68529399999999996</c:v>
                 </c:pt>
                 <c:pt idx="3">
-                  <c:v>0.7065529999999991</c:v>
+                  <c:v>0.70655299999999888</c:v>
                 </c:pt>
                 <c:pt idx="4">
-                  <c:v>0.69499000000000077</c:v>
+                  <c:v>0.694990000000001</c:v>
                 </c:pt>
                 <c:pt idx="5">
                   <c:v>0.68501599999999996</c:v>
@@ -1462,7 +1459,7 @@
                   <c:v>0.70837099999999997</c:v>
                 </c:pt>
                 <c:pt idx="8">
-                  <c:v>0.70489800000000102</c:v>
+                  <c:v>0.70489800000000125</c:v>
                 </c:pt>
                 <c:pt idx="9">
                   <c:v>0.70848500000000003</c:v>
@@ -1474,7 +1471,7 @@
                   <c:v>0.89915599999999996</c:v>
                 </c:pt>
                 <c:pt idx="12">
-                  <c:v>1.1879919999999984</c:v>
+                  <c:v>1.1879919999999979</c:v>
                 </c:pt>
                 <c:pt idx="13">
                   <c:v>1.0820909999999999</c:v>
@@ -1483,7 +1480,7 @@
                   <c:v>1.0125239999999998</c:v>
                 </c:pt>
                 <c:pt idx="15">
-                  <c:v>0.9576490000000013</c:v>
+                  <c:v>0.95764900000000175</c:v>
                 </c:pt>
                 <c:pt idx="16">
                   <c:v>1.3129739999999999</c:v>
@@ -1498,7 +1495,7 @@
                   <c:v>1.2581209999999998</c:v>
                 </c:pt>
                 <c:pt idx="20">
-                  <c:v>1.5035419999999984</c:v>
+                  <c:v>1.5035419999999979</c:v>
                 </c:pt>
                 <c:pt idx="21">
                   <c:v>1.310514</c:v>
@@ -1510,7 +1507,7 @@
                   <c:v>1.56331</c:v>
                 </c:pt>
                 <c:pt idx="24">
-                  <c:v>1.4275659999999983</c:v>
+                  <c:v>1.4275659999999977</c:v>
                 </c:pt>
                 <c:pt idx="25">
                   <c:v>1.324241</c:v>
@@ -1525,11 +1522,11 @@
             </c:numRef>
           </c:yVal>
         </c:ser>
-        <c:axId val="65466368"/>
-        <c:axId val="65468288"/>
+        <c:axId val="144361344"/>
+        <c:axId val="144048128"/>
       </c:scatterChart>
       <c:valAx>
-        <c:axId val="65466368"/>
+        <c:axId val="144361344"/>
         <c:scaling>
           <c:logBase val="10"/>
           <c:orientation val="minMax"/>
@@ -1553,7 +1550,6 @@
               </a:p>
             </c:rich>
           </c:tx>
-          <c:layout/>
         </c:title>
         <c:numFmt formatCode="#,##0_);\(#,##0\)" sourceLinked="0"/>
         <c:tickLblPos val="nextTo"/>
@@ -1567,12 +1563,12 @@
             <a:endParaRPr lang="ja-JP"/>
           </a:p>
         </c:txPr>
-        <c:crossAx val="65468288"/>
+        <c:crossAx val="144048128"/>
         <c:crosses val="autoZero"/>
         <c:crossBetween val="midCat"/>
       </c:valAx>
       <c:valAx>
-        <c:axId val="65468288"/>
+        <c:axId val="144048128"/>
         <c:scaling>
           <c:orientation val="minMax"/>
         </c:scaling>
@@ -1607,7 +1603,6 @@
               </a:p>
             </c:rich>
           </c:tx>
-          <c:layout/>
         </c:title>
         <c:numFmt formatCode="General" sourceLinked="0"/>
         <c:tickLblPos val="nextTo"/>
@@ -1621,14 +1616,13 @@
             <a:endParaRPr lang="ja-JP"/>
           </a:p>
         </c:txPr>
-        <c:crossAx val="65466368"/>
+        <c:crossAx val="144361344"/>
         <c:crosses val="autoZero"/>
         <c:crossBetween val="midCat"/>
       </c:valAx>
     </c:plotArea>
     <c:legend>
       <c:legendPos val="r"/>
-      <c:layout/>
       <c:txPr>
         <a:bodyPr/>
         <a:lstStyle/>
@@ -1669,8 +1663,8 @@
           <c:yMode val="edge"/>
           <c:x val="0.1485095265869544"/>
           <c:y val="5.5131471468061063E-2"/>
-          <c:w val="0.61399047341304736"/>
-          <c:h val="0.71476457054553988"/>
+          <c:w val="0.61399047341304791"/>
+          <c:h val="0.7147645705455401"/>
         </c:manualLayout>
       </c:layout>
       <c:scatterChart>
@@ -1858,10 +1852,10 @@
                   <c:v>21.020671999999987</c:v>
                 </c:pt>
                 <c:pt idx="23">
-                  <c:v>29.409279999999971</c:v>
+                  <c:v>29.409279999999963</c:v>
                 </c:pt>
                 <c:pt idx="24">
-                  <c:v>29.409279999999971</c:v>
+                  <c:v>29.409279999999963</c:v>
                 </c:pt>
                 <c:pt idx="25">
                   <c:v>37.797888</c:v>
@@ -1870,7 +1864,7 @@
                   <c:v>37.797888</c:v>
                 </c:pt>
                 <c:pt idx="27">
-                  <c:v>41.992192000000067</c:v>
+                  <c:v>41.992192000000088</c:v>
                 </c:pt>
               </c:numCache>
             </c:numRef>
@@ -2053,10 +2047,10 @@
                   <c:v>25.231359999999999</c:v>
                 </c:pt>
                 <c:pt idx="21">
-                  <c:v>29.425663999999969</c:v>
+                  <c:v>29.425663999999962</c:v>
                 </c:pt>
                 <c:pt idx="22">
-                  <c:v>29.425663999999969</c:v>
+                  <c:v>29.425663999999962</c:v>
                 </c:pt>
                 <c:pt idx="23">
                   <c:v>46.20288</c:v>
@@ -2071,7 +2065,7 @@
                   <c:v>54.591487999999998</c:v>
                 </c:pt>
                 <c:pt idx="27">
-                  <c:v>58.78579200000005</c:v>
+                  <c:v>58.785792000000065</c:v>
                 </c:pt>
               </c:numCache>
             </c:numRef>
@@ -2278,11 +2272,11 @@
             </c:numRef>
           </c:yVal>
         </c:ser>
-        <c:axId val="133291392"/>
-        <c:axId val="133314048"/>
+        <c:axId val="144434688"/>
+        <c:axId val="144436608"/>
       </c:scatterChart>
       <c:valAx>
-        <c:axId val="133291392"/>
+        <c:axId val="144434688"/>
         <c:scaling>
           <c:logBase val="10"/>
           <c:orientation val="minMax"/>
@@ -2306,7 +2300,6 @@
               </a:p>
             </c:rich>
           </c:tx>
-          <c:layout/>
         </c:title>
         <c:numFmt formatCode="#,##0_);\(#,##0\)" sourceLinked="0"/>
         <c:tickLblPos val="nextTo"/>
@@ -2320,12 +2313,12 @@
             <a:endParaRPr lang="ja-JP"/>
           </a:p>
         </c:txPr>
-        <c:crossAx val="133314048"/>
+        <c:crossAx val="144436608"/>
         <c:crosses val="autoZero"/>
         <c:crossBetween val="midCat"/>
       </c:valAx>
       <c:valAx>
-        <c:axId val="133314048"/>
+        <c:axId val="144436608"/>
         <c:scaling>
           <c:orientation val="minMax"/>
         </c:scaling>
@@ -2356,7 +2349,6 @@
               </a:p>
             </c:rich>
           </c:tx>
-          <c:layout/>
         </c:title>
         <c:numFmt formatCode="General" sourceLinked="0"/>
         <c:tickLblPos val="nextTo"/>
@@ -2370,14 +2362,13 @@
             <a:endParaRPr lang="ja-JP"/>
           </a:p>
         </c:txPr>
-        <c:crossAx val="133291392"/>
+        <c:crossAx val="144434688"/>
         <c:crosses val="autoZero"/>
         <c:crossBetween val="midCat"/>
       </c:valAx>
     </c:plotArea>
     <c:legend>
       <c:legendPos val="r"/>
-      <c:layout/>
       <c:txPr>
         <a:bodyPr/>
         <a:lstStyle/>
@@ -2418,8 +2409,8 @@
           <c:yMode val="edge"/>
           <c:x val="0.1485095265869544"/>
           <c:y val="5.5131471468061063E-2"/>
-          <c:w val="0.61399047341304891"/>
-          <c:h val="0.71476457054554055"/>
+          <c:w val="0.61399047341304935"/>
+          <c:h val="0.71476457054554077"/>
         </c:manualLayout>
       </c:layout>
       <c:scatterChart>
@@ -2538,7 +2529,7 @@
                 <c:formatCode>General</c:formatCode>
                 <c:ptCount val="28"/>
                 <c:pt idx="0">
-                  <c:v>0.37541400000000086</c:v>
+                  <c:v>0.37541400000000097</c:v>
                 </c:pt>
                 <c:pt idx="1">
                   <c:v>0.40710000000000002</c:v>
@@ -2568,7 +2559,7 @@
                   <c:v>0.57179899999999995</c:v>
                 </c:pt>
                 <c:pt idx="10">
-                  <c:v>0.67119600000000113</c:v>
+                  <c:v>0.67119600000000135</c:v>
                 </c:pt>
                 <c:pt idx="11">
                   <c:v>0.70309600000000005</c:v>
@@ -2577,7 +2568,7 @@
                   <c:v>0.78449199999999997</c:v>
                 </c:pt>
                 <c:pt idx="13">
-                  <c:v>0.843692000000001</c:v>
+                  <c:v>0.84369200000000122</c:v>
                 </c:pt>
                 <c:pt idx="14">
                   <c:v>0.83088899999999999</c:v>
@@ -2598,10 +2589,10 @@
                   <c:v>1.1936899999999999</c:v>
                 </c:pt>
                 <c:pt idx="20">
-                  <c:v>1.3494969999999979</c:v>
+                  <c:v>1.3494969999999975</c:v>
                 </c:pt>
                 <c:pt idx="21">
-                  <c:v>1.4549969999999977</c:v>
+                  <c:v>1.4549969999999972</c:v>
                 </c:pt>
                 <c:pt idx="22">
                   <c:v>1.5376089999999998</c:v>
@@ -2610,13 +2601,13 @@
                   <c:v>1.595092</c:v>
                 </c:pt>
                 <c:pt idx="24">
-                  <c:v>1.6758919999999979</c:v>
+                  <c:v>1.6758919999999975</c:v>
                 </c:pt>
                 <c:pt idx="25">
                   <c:v>1.7090079999999999</c:v>
                 </c:pt>
                 <c:pt idx="26">
-                  <c:v>1.7350909999999979</c:v>
+                  <c:v>1.7350909999999975</c:v>
                 </c:pt>
                 <c:pt idx="27">
                   <c:v>1.759887</c:v>
@@ -2748,16 +2739,16 @@
                   <c:v>0.16689300000000001</c:v>
                 </c:pt>
                 <c:pt idx="3">
-                  <c:v>0.15540100000000037</c:v>
+                  <c:v>0.15540100000000046</c:v>
                 </c:pt>
                 <c:pt idx="4">
-                  <c:v>0.15921600000000047</c:v>
+                  <c:v>0.15921600000000058</c:v>
                 </c:pt>
                 <c:pt idx="5">
                   <c:v>0.17600099999999999</c:v>
                 </c:pt>
                 <c:pt idx="6">
-                  <c:v>0.19948500000000025</c:v>
+                  <c:v>0.1994850000000003</c:v>
                 </c:pt>
                 <c:pt idx="7">
                   <c:v>0.21068999999999999</c:v>
@@ -2769,7 +2760,7 @@
                   <c:v>0.19750599999999999</c:v>
                 </c:pt>
                 <c:pt idx="10">
-                  <c:v>0.2783060000000005</c:v>
+                  <c:v>0.27830600000000061</c:v>
                 </c:pt>
                 <c:pt idx="11">
                   <c:v>0.35250200000000032</c:v>
@@ -2778,7 +2769,7 @@
                   <c:v>0.39699100000000032</c:v>
                 </c:pt>
                 <c:pt idx="13">
-                  <c:v>0.43048900000000057</c:v>
+                  <c:v>0.43048900000000068</c:v>
                 </c:pt>
                 <c:pt idx="14">
                   <c:v>0.45130300000000001</c:v>
@@ -2790,16 +2781,16 @@
                   <c:v>0.50509000000000004</c:v>
                 </c:pt>
                 <c:pt idx="17">
-                  <c:v>0.55789900000000126</c:v>
+                  <c:v>0.5578990000000017</c:v>
                 </c:pt>
                 <c:pt idx="18">
                   <c:v>0.50909499999999996</c:v>
                 </c:pt>
                 <c:pt idx="19">
-                  <c:v>0.605321000000001</c:v>
+                  <c:v>0.60532100000000122</c:v>
                 </c:pt>
                 <c:pt idx="20">
-                  <c:v>0.64940500000000112</c:v>
+                  <c:v>0.64940500000000134</c:v>
                 </c:pt>
                 <c:pt idx="21">
                   <c:v>0.73168299999999997</c:v>
@@ -2808,19 +2799,19 @@
                   <c:v>0.72569799999999995</c:v>
                 </c:pt>
                 <c:pt idx="23">
-                  <c:v>0.70509900000000125</c:v>
+                  <c:v>0.70509900000000159</c:v>
                 </c:pt>
                 <c:pt idx="24">
                   <c:v>0.75180499999999995</c:v>
                 </c:pt>
                 <c:pt idx="25">
-                  <c:v>0.74398500000000112</c:v>
+                  <c:v>0.74398500000000134</c:v>
                 </c:pt>
                 <c:pt idx="26">
                   <c:v>0.74529600000000062</c:v>
                 </c:pt>
                 <c:pt idx="27">
-                  <c:v>0.81179100000000126</c:v>
+                  <c:v>0.81179100000000171</c:v>
                 </c:pt>
               </c:numCache>
             </c:numRef>
@@ -2940,22 +2931,22 @@
                 <c:formatCode>General</c:formatCode>
                 <c:ptCount val="28"/>
                 <c:pt idx="0">
-                  <c:v>0.14581700000000028</c:v>
+                  <c:v>0.14581700000000034</c:v>
                 </c:pt>
                 <c:pt idx="1">
                   <c:v>0.16989699999999999</c:v>
                 </c:pt>
                 <c:pt idx="2">
-                  <c:v>0.16999200000000031</c:v>
+                  <c:v>0.16999200000000037</c:v>
                 </c:pt>
                 <c:pt idx="3">
-                  <c:v>0.17859900000000031</c:v>
+                  <c:v>0.17859900000000037</c:v>
                 </c:pt>
                 <c:pt idx="4">
-                  <c:v>0.18000600000000028</c:v>
+                  <c:v>0.18000600000000033</c:v>
                 </c:pt>
                 <c:pt idx="5">
-                  <c:v>0.19099700000000028</c:v>
+                  <c:v>0.19099700000000033</c:v>
                 </c:pt>
                 <c:pt idx="6">
                   <c:v>0.20000899999999999</c:v>
@@ -2967,13 +2958,13 @@
                   <c:v>0.22170500000000001</c:v>
                 </c:pt>
                 <c:pt idx="9">
-                  <c:v>0.23798900000000031</c:v>
+                  <c:v>0.23798900000000037</c:v>
                 </c:pt>
                 <c:pt idx="10">
                   <c:v>0.31161300000000008</c:v>
                 </c:pt>
                 <c:pt idx="11">
-                  <c:v>0.31681100000000056</c:v>
+                  <c:v>0.31681100000000068</c:v>
                 </c:pt>
                 <c:pt idx="12">
                   <c:v>0.43439900000000031</c:v>
@@ -3009,7 +3000,7 @@
                   <c:v>1.0312079999999999</c:v>
                 </c:pt>
                 <c:pt idx="23">
-                  <c:v>1.0613919999999977</c:v>
+                  <c:v>1.0613919999999972</c:v>
                 </c:pt>
                 <c:pt idx="24">
                   <c:v>1.0696889999999999</c:v>
@@ -3027,11 +3018,11 @@
             </c:numRef>
           </c:yVal>
         </c:ser>
-        <c:axId val="133432448"/>
-        <c:axId val="133434368"/>
+        <c:axId val="144871424"/>
+        <c:axId val="144873344"/>
       </c:scatterChart>
       <c:valAx>
-        <c:axId val="133432448"/>
+        <c:axId val="144871424"/>
         <c:scaling>
           <c:logBase val="10"/>
           <c:orientation val="minMax"/>
@@ -3069,12 +3060,12 @@
             <a:endParaRPr lang="ja-JP"/>
           </a:p>
         </c:txPr>
-        <c:crossAx val="133434368"/>
+        <c:crossAx val="144873344"/>
         <c:crosses val="autoZero"/>
         <c:crossBetween val="midCat"/>
       </c:valAx>
       <c:valAx>
-        <c:axId val="133434368"/>
+        <c:axId val="144873344"/>
         <c:scaling>
           <c:orientation val="minMax"/>
         </c:scaling>
@@ -3123,7 +3114,7 @@
             <a:endParaRPr lang="ja-JP"/>
           </a:p>
         </c:txPr>
-        <c:crossAx val="133432448"/>
+        <c:crossAx val="144871424"/>
         <c:crosses val="autoZero"/>
         <c:crossBetween val="midCat"/>
       </c:valAx>
@@ -3171,8 +3162,8 @@
           <c:yMode val="edge"/>
           <c:x val="0.1485095265869544"/>
           <c:y val="5.5131471468061063E-2"/>
-          <c:w val="0.61399047341304991"/>
-          <c:h val="0.71476457054554099"/>
+          <c:w val="0.61399047341305035"/>
+          <c:h val="0.71476457054554121"/>
         </c:manualLayout>
       </c:layout>
       <c:scatterChart>
@@ -3291,7 +3282,7 @@
                 <c:formatCode>General</c:formatCode>
                 <c:ptCount val="28"/>
                 <c:pt idx="0">
-                  <c:v>0.39100600000000085</c:v>
+                  <c:v>0.39100600000000096</c:v>
                 </c:pt>
                 <c:pt idx="1">
                   <c:v>0.422597</c:v>
@@ -3324,10 +3315,10 @@
                   <c:v>0.50181199999999959</c:v>
                 </c:pt>
                 <c:pt idx="11">
-                  <c:v>0.49086400000000086</c:v>
+                  <c:v>0.49086400000000097</c:v>
                 </c:pt>
                 <c:pt idx="12">
-                  <c:v>0.49237000000000092</c:v>
+                  <c:v>0.49237000000000103</c:v>
                 </c:pt>
                 <c:pt idx="13">
                   <c:v>0.48800000000000032</c:v>
@@ -3336,19 +3327,19 @@
                   <c:v>0.49154400000000031</c:v>
                 </c:pt>
                 <c:pt idx="15">
-                  <c:v>0.49698700000000068</c:v>
+                  <c:v>0.49698700000000084</c:v>
                 </c:pt>
                 <c:pt idx="16">
                   <c:v>0.4967390000000001</c:v>
                 </c:pt>
                 <c:pt idx="17">
-                  <c:v>0.50391399999999853</c:v>
+                  <c:v>0.50391399999999831</c:v>
                 </c:pt>
                 <c:pt idx="18">
                   <c:v>0.50076500000000002</c:v>
                 </c:pt>
                 <c:pt idx="19">
-                  <c:v>0.57309900000000158</c:v>
+                  <c:v>0.57309900000000191</c:v>
                 </c:pt>
                 <c:pt idx="20">
                   <c:v>0.63900600000000063</c:v>
@@ -3501,7 +3492,7 @@
                   <c:v>1.4410809999999998</c:v>
                 </c:pt>
                 <c:pt idx="3">
-                  <c:v>1.1842850000000029</c:v>
+                  <c:v>1.1842850000000034</c:v>
                 </c:pt>
                 <c:pt idx="4">
                   <c:v>1.0293959999999998</c:v>
@@ -3510,7 +3501,7 @@
                   <c:v>0.91950100000000001</c:v>
                 </c:pt>
                 <c:pt idx="6">
-                  <c:v>0.84216299999999877</c:v>
+                  <c:v>0.84216299999999855</c:v>
                 </c:pt>
                 <c:pt idx="7">
                   <c:v>0.78391999999999951</c:v>
@@ -3531,7 +3522,7 @@
                   <c:v>0.352663</c:v>
                 </c:pt>
                 <c:pt idx="13">
-                  <c:v>0.32933200000000068</c:v>
+                  <c:v>0.32933200000000085</c:v>
                 </c:pt>
                 <c:pt idx="14">
                   <c:v>0.31734700000000032</c:v>
@@ -3555,16 +3546,16 @@
                   <c:v>0.298707</c:v>
                 </c:pt>
                 <c:pt idx="21">
-                  <c:v>0.31312200000000068</c:v>
+                  <c:v>0.31312200000000084</c:v>
                 </c:pt>
                 <c:pt idx="22">
-                  <c:v>0.33010800000000068</c:v>
+                  <c:v>0.33010800000000085</c:v>
                 </c:pt>
                 <c:pt idx="23">
                   <c:v>0.49149300000000001</c:v>
                 </c:pt>
                 <c:pt idx="24">
-                  <c:v>0.47131600000000068</c:v>
+                  <c:v>0.47131600000000085</c:v>
                 </c:pt>
                 <c:pt idx="25">
                   <c:v>0.45779799999999998</c:v>
@@ -3696,16 +3687,16 @@
                   <c:v>0.64206099999999999</c:v>
                 </c:pt>
                 <c:pt idx="1">
-                  <c:v>0.67400900000000208</c:v>
+                  <c:v>0.67400900000000252</c:v>
                 </c:pt>
                 <c:pt idx="2">
                   <c:v>0.68529399999999996</c:v>
                 </c:pt>
                 <c:pt idx="3">
-                  <c:v>0.70655299999999865</c:v>
+                  <c:v>0.70655299999999832</c:v>
                 </c:pt>
                 <c:pt idx="4">
-                  <c:v>0.69499000000000122</c:v>
+                  <c:v>0.69499000000000144</c:v>
                 </c:pt>
                 <c:pt idx="5">
                   <c:v>0.68501599999999996</c:v>
@@ -3717,7 +3708,7 @@
                   <c:v>0.70837099999999997</c:v>
                 </c:pt>
                 <c:pt idx="8">
-                  <c:v>0.70489800000000158</c:v>
+                  <c:v>0.70489800000000191</c:v>
                 </c:pt>
                 <c:pt idx="9">
                   <c:v>0.70848500000000003</c:v>
@@ -3729,7 +3720,7 @@
                   <c:v>0.89915599999999996</c:v>
                 </c:pt>
                 <c:pt idx="12">
-                  <c:v>1.1879919999999975</c:v>
+                  <c:v>1.1879919999999971</c:v>
                 </c:pt>
                 <c:pt idx="13">
                   <c:v>1.0820909999999999</c:v>
@@ -3738,7 +3729,7 @@
                   <c:v>1.0125239999999998</c:v>
                 </c:pt>
                 <c:pt idx="15">
-                  <c:v>0.95764900000000208</c:v>
+                  <c:v>0.95764900000000253</c:v>
                 </c:pt>
                 <c:pt idx="16">
                   <c:v>1.3129739999999999</c:v>
@@ -3753,7 +3744,7 @@
                   <c:v>1.2581209999999998</c:v>
                 </c:pt>
                 <c:pt idx="20">
-                  <c:v>1.5035419999999975</c:v>
+                  <c:v>1.503541999999997</c:v>
                 </c:pt>
                 <c:pt idx="21">
                   <c:v>1.310514</c:v>
@@ -3765,7 +3756,7 @@
                   <c:v>1.56331</c:v>
                 </c:pt>
                 <c:pt idx="24">
-                  <c:v>1.4275659999999972</c:v>
+                  <c:v>1.4275659999999968</c:v>
                 </c:pt>
                 <c:pt idx="25">
                   <c:v>1.324241</c:v>
@@ -3780,11 +3771,11 @@
             </c:numRef>
           </c:yVal>
         </c:ser>
-        <c:axId val="133571712"/>
-        <c:axId val="133573632"/>
+        <c:axId val="144670720"/>
+        <c:axId val="144672640"/>
       </c:scatterChart>
       <c:valAx>
-        <c:axId val="133571712"/>
+        <c:axId val="144670720"/>
         <c:scaling>
           <c:logBase val="10"/>
           <c:orientation val="minMax"/>
@@ -3822,12 +3813,12 @@
             <a:endParaRPr lang="ja-JP"/>
           </a:p>
         </c:txPr>
-        <c:crossAx val="133573632"/>
+        <c:crossAx val="144672640"/>
         <c:crosses val="autoZero"/>
         <c:crossBetween val="midCat"/>
       </c:valAx>
       <c:valAx>
-        <c:axId val="133573632"/>
+        <c:axId val="144672640"/>
         <c:scaling>
           <c:orientation val="minMax"/>
         </c:scaling>
@@ -3876,7 +3867,7 @@
             <a:endParaRPr lang="ja-JP"/>
           </a:p>
         </c:txPr>
-        <c:crossAx val="133571712"/>
+        <c:crossAx val="144670720"/>
         <c:crosses val="autoZero"/>
         <c:crossBetween val="midCat"/>
       </c:valAx>
@@ -3913,6 +3904,7 @@
 
 <file path=ppt/charts/chart6.xml><?xml version="1.0" encoding="utf-8"?>
 <c:chartSpace xmlns:c="http://schemas.openxmlformats.org/drawingml/2006/chart" xmlns:a="http://schemas.openxmlformats.org/drawingml/2006/main" xmlns:r="http://schemas.openxmlformats.org/officeDocument/2006/relationships">
+  <c:date1904 val="1"/>
   <c:lang val="ja-JP"/>
   <c:chart>
     <c:plotArea>
@@ -3923,8 +3915,8 @@
           <c:yMode val="edge"/>
           <c:x val="0.1485095265869544"/>
           <c:y val="5.5131471468061063E-2"/>
-          <c:w val="0.61399047341304835"/>
-          <c:h val="0.71476457054554032"/>
+          <c:w val="0.61399047341304891"/>
+          <c:h val="0.71476457054554055"/>
         </c:manualLayout>
       </c:layout>
       <c:scatterChart>
@@ -4112,10 +4104,10 @@
                   <c:v>21.020671999999987</c:v>
                 </c:pt>
                 <c:pt idx="23">
-                  <c:v>29.409279999999963</c:v>
+                  <c:v>29.409279999999956</c:v>
                 </c:pt>
                 <c:pt idx="24">
-                  <c:v>29.409279999999963</c:v>
+                  <c:v>29.409279999999956</c:v>
                 </c:pt>
                 <c:pt idx="25">
                   <c:v>33.603584000000005</c:v>
@@ -4301,16 +4293,16 @@
                   <c:v>16.842751999999987</c:v>
                 </c:pt>
                 <c:pt idx="19">
-                  <c:v>21.037056000000032</c:v>
+                  <c:v>21.037056000000035</c:v>
                 </c:pt>
                 <c:pt idx="20">
                   <c:v>25.231359999999999</c:v>
                 </c:pt>
                 <c:pt idx="21">
-                  <c:v>29.425663999999962</c:v>
+                  <c:v>29.425663999999955</c:v>
                 </c:pt>
                 <c:pt idx="22">
-                  <c:v>29.425663999999962</c:v>
+                  <c:v>29.425663999999955</c:v>
                 </c:pt>
                 <c:pt idx="23">
                   <c:v>46.20288</c:v>
@@ -4679,16 +4671,16 @@
                   <c:v>0.13295199999999999</c:v>
                 </c:pt>
                 <c:pt idx="11">
-                  <c:v>0.20956000000000025</c:v>
+                  <c:v>0.2095600000000003</c:v>
                 </c:pt>
                 <c:pt idx="12">
-                  <c:v>0.2813600000000005</c:v>
+                  <c:v>0.28136000000000061</c:v>
                 </c:pt>
                 <c:pt idx="13">
                   <c:v>0.34684800000000032</c:v>
                 </c:pt>
                 <c:pt idx="14">
-                  <c:v>0.41982400000000075</c:v>
+                  <c:v>0.41982400000000092</c:v>
                 </c:pt>
                 <c:pt idx="15">
                   <c:v>0.47614400000000001</c:v>
@@ -4706,7 +4698,7 @@
                   <c:v>1.3507439999999999</c:v>
                 </c:pt>
                 <c:pt idx="20">
-                  <c:v>1.9824480000000022</c:v>
+                  <c:v>1.9824480000000027</c:v>
                 </c:pt>
                 <c:pt idx="21">
                   <c:v>2.5427360000000001</c:v>
@@ -4733,11 +4725,11 @@
             </c:numRef>
           </c:yVal>
         </c:ser>
-        <c:axId val="133670784"/>
-        <c:axId val="133677056"/>
+        <c:axId val="145077760"/>
+        <c:axId val="145084416"/>
       </c:scatterChart>
       <c:valAx>
-        <c:axId val="133670784"/>
+        <c:axId val="145077760"/>
         <c:scaling>
           <c:logBase val="10"/>
           <c:orientation val="minMax"/>
@@ -4775,12 +4767,12 @@
             <a:endParaRPr lang="ja-JP"/>
           </a:p>
         </c:txPr>
-        <c:crossAx val="133677056"/>
+        <c:crossAx val="145084416"/>
         <c:crosses val="autoZero"/>
         <c:crossBetween val="midCat"/>
       </c:valAx>
       <c:valAx>
-        <c:axId val="133677056"/>
+        <c:axId val="145084416"/>
         <c:scaling>
           <c:orientation val="minMax"/>
         </c:scaling>
@@ -4825,7 +4817,7 @@
             <a:endParaRPr lang="ja-JP"/>
           </a:p>
         </c:txPr>
-        <c:crossAx val="133670784"/>
+        <c:crossAx val="145077760"/>
         <c:crosses val="autoZero"/>
         <c:crossBetween val="midCat"/>
       </c:valAx>
@@ -4943,7 +4935,7 @@
             <a:fld id="{271512BE-049F-459C-A0DB-3BF1A0FBA93A}" type="datetimeFigureOut">
               <a:rPr kumimoji="1" lang="ja-JP" altLang="en-US" smtClean="0"/>
               <a:pPr/>
-              <a:t>2011/11/30</a:t>
+              <a:t>2011/12/2</a:t>
             </a:fld>
             <a:endParaRPr kumimoji="1" lang="ja-JP" altLang="en-US"/>
           </a:p>
@@ -4961,8 +4953,8 @@
         </p:nvSpPr>
         <p:spPr>
           <a:xfrm>
-            <a:off x="1143000" y="685800"/>
-            <a:ext cx="4572000" cy="3429000"/>
+            <a:off x="693000" y="685800"/>
+            <a:ext cx="5472000" cy="4104000"/>
           </a:xfrm>
           <a:prstGeom prst="rect">
             <a:avLst/>
@@ -4994,8 +4986,8 @@
         </p:nvSpPr>
         <p:spPr>
           <a:xfrm>
-            <a:off x="685800" y="4343400"/>
-            <a:ext cx="5486400" cy="4114800"/>
+            <a:off x="685800" y="5004048"/>
+            <a:ext cx="5486400" cy="3454152"/>
           </a:xfrm>
           <a:prstGeom prst="rect">
             <a:avLst/>
@@ -5148,7 +5140,10 @@
   <p:clrMap bg1="lt1" tx1="dk1" bg2="lt2" tx2="dk2" accent1="accent1" accent2="accent2" accent3="accent3" accent4="accent4" accent5="accent5" accent6="accent6" hlink="hlink" folHlink="folHlink"/>
   <p:notesStyle>
     <a:lvl1pPr marL="0" algn="l" defTabSz="914400" rtl="0" eaLnBrk="1" latinLnBrk="0" hangingPunct="1">
-      <a:defRPr kumimoji="1" sz="1200" kern="1200">
+      <a:lnSpc>
+        <a:spcPct val="125000"/>
+      </a:lnSpc>
+      <a:defRPr kumimoji="1" sz="1800" kern="1200">
         <a:solidFill>
           <a:schemeClr val="tx1"/>
         </a:solidFill>
@@ -5158,7 +5153,10 @@
       </a:defRPr>
     </a:lvl1pPr>
     <a:lvl2pPr marL="457200" algn="l" defTabSz="914400" rtl="0" eaLnBrk="1" latinLnBrk="0" hangingPunct="1">
-      <a:defRPr kumimoji="1" sz="1200" kern="1200">
+      <a:lnSpc>
+        <a:spcPct val="125000"/>
+      </a:lnSpc>
+      <a:defRPr kumimoji="1" sz="1800" kern="1200">
         <a:solidFill>
           <a:schemeClr val="tx1"/>
         </a:solidFill>
@@ -5168,7 +5166,10 @@
       </a:defRPr>
     </a:lvl2pPr>
     <a:lvl3pPr marL="914400" algn="l" defTabSz="914400" rtl="0" eaLnBrk="1" latinLnBrk="0" hangingPunct="1">
-      <a:defRPr kumimoji="1" sz="1200" kern="1200">
+      <a:lnSpc>
+        <a:spcPct val="125000"/>
+      </a:lnSpc>
+      <a:defRPr kumimoji="1" sz="1800" kern="1200">
         <a:solidFill>
           <a:schemeClr val="tx1"/>
         </a:solidFill>
@@ -5178,7 +5179,10 @@
       </a:defRPr>
     </a:lvl3pPr>
     <a:lvl4pPr marL="1371600" algn="l" defTabSz="914400" rtl="0" eaLnBrk="1" latinLnBrk="0" hangingPunct="1">
-      <a:defRPr kumimoji="1" sz="1200" kern="1200">
+      <a:lnSpc>
+        <a:spcPct val="125000"/>
+      </a:lnSpc>
+      <a:defRPr kumimoji="1" sz="1800" kern="1200">
         <a:solidFill>
           <a:schemeClr val="tx1"/>
         </a:solidFill>
@@ -5188,7 +5192,10 @@
       </a:defRPr>
     </a:lvl4pPr>
     <a:lvl5pPr marL="1828800" algn="l" defTabSz="914400" rtl="0" eaLnBrk="1" latinLnBrk="0" hangingPunct="1">
-      <a:defRPr kumimoji="1" sz="1200" kern="1200">
+      <a:lnSpc>
+        <a:spcPct val="125000"/>
+      </a:lnSpc>
+      <a:defRPr kumimoji="1" sz="1800" kern="1200">
         <a:solidFill>
           <a:schemeClr val="tx1"/>
         </a:solidFill>
@@ -5287,31 +5294,7 @@
           </a:bodyPr>
           <a:lstStyle/>
           <a:p>
-            <a:r>
-              <a:rPr kumimoji="1" lang="ja-JP" altLang="en-US" dirty="0" smtClean="0"/>
-              <a:t>正確には以前のバージョンにも </a:t>
-            </a:r>
-            <a:r>
-              <a:rPr kumimoji="1" lang="en-US" altLang="ja-JP" dirty="0" err="1" smtClean="0"/>
-              <a:t>grn_dat</a:t>
-            </a:r>
-            <a:r>
-              <a:rPr kumimoji="1" lang="ja-JP" altLang="en-US" dirty="0" smtClean="0"/>
-              <a:t> のコードは入っていたのですが，現在の仕様になり，実用に供されるようになったのは </a:t>
-            </a:r>
-            <a:r>
-              <a:rPr kumimoji="1" lang="en-US" altLang="ja-JP" dirty="0" err="1" smtClean="0"/>
-              <a:t>groonga</a:t>
-            </a:r>
-            <a:r>
-              <a:rPr kumimoji="1" lang="en-US" altLang="ja-JP" dirty="0" smtClean="0"/>
-              <a:t> 1.2.8</a:t>
-            </a:r>
-            <a:r>
-              <a:rPr kumimoji="1" lang="ja-JP" altLang="en-US" dirty="0" smtClean="0"/>
-              <a:t> からです．</a:t>
-            </a:r>
-            <a:endParaRPr kumimoji="1" lang="ja-JP" altLang="en-US" dirty="0"/>
+            <a:endParaRPr kumimoji="1" lang="ja-JP" altLang="en-US"/>
           </a:p>
         </p:txBody>
       </p:sp>
@@ -5333,7 +5316,7 @@
             <a:fld id="{82B770F3-4A5E-4127-9297-278B18C89B74}" type="slidenum">
               <a:rPr kumimoji="1" lang="ja-JP" altLang="en-US" smtClean="0"/>
               <a:pPr/>
-              <a:t>2</a:t>
+              <a:t>1</a:t>
             </a:fld>
             <a:endParaRPr kumimoji="1" lang="ja-JP" altLang="en-US"/>
           </a:p>
@@ -5393,7 +5376,27 @@
           </a:bodyPr>
           <a:lstStyle/>
           <a:p>
-            <a:endParaRPr kumimoji="1" lang="ja-JP" altLang="en-US" dirty="0"/>
+            <a:r>
+              <a:rPr kumimoji="1" lang="ja-JP" altLang="en-US" dirty="0" smtClean="0"/>
+              <a:t>今回の発表では，説明を簡単にする目的で，</a:t>
+            </a:r>
+            <a:r>
+              <a:rPr kumimoji="1" lang="en-US" altLang="ja-JP" dirty="0" smtClean="0"/>
+              <a:t>Common Prefix Search </a:t>
+            </a:r>
+            <a:r>
+              <a:rPr kumimoji="1" lang="ja-JP" altLang="en-US" dirty="0" smtClean="0"/>
+              <a:t>と </a:t>
+            </a:r>
+            <a:r>
+              <a:rPr kumimoji="1" lang="en-US" altLang="ja-JP" dirty="0" smtClean="0"/>
+              <a:t>Predictive Search</a:t>
+            </a:r>
+            <a:r>
+              <a:rPr kumimoji="1" lang="ja-JP" altLang="en-US" dirty="0" smtClean="0"/>
+              <a:t> をまとめて前方一致検索ということにしました．</a:t>
+            </a:r>
+            <a:endParaRPr kumimoji="1" lang="en-US" altLang="ja-JP" dirty="0" smtClean="0"/>
           </a:p>
         </p:txBody>
       </p:sp>
@@ -5415,7 +5418,7 @@
             <a:fld id="{82B770F3-4A5E-4127-9297-278B18C89B74}" type="slidenum">
               <a:rPr kumimoji="1" lang="ja-JP" altLang="en-US" smtClean="0"/>
               <a:pPr/>
-              <a:t>12</a:t>
+              <a:t>10</a:t>
             </a:fld>
             <a:endParaRPr kumimoji="1" lang="ja-JP" altLang="en-US"/>
           </a:p>
@@ -5477,15 +5480,7 @@
           <a:p>
             <a:r>
               <a:rPr kumimoji="1" lang="ja-JP" altLang="en-US" dirty="0" smtClean="0"/>
-              <a:t>参考資料に書いてある内容は，本来は参照ロックフリーでないダブル配列をどうやって参照ロックフリーにしたのか，参照ロックフリーにすることで悪化した更新効率をどうやって補っているのか，ダブル配列の苦手な </a:t>
-            </a:r>
-            <a:r>
-              <a:rPr kumimoji="1" lang="en-US" altLang="ja-JP" dirty="0" smtClean="0"/>
-              <a:t>Predictive Search</a:t>
-            </a:r>
-            <a:r>
-              <a:rPr kumimoji="1" lang="ja-JP" altLang="en-US" dirty="0" smtClean="0"/>
-              <a:t> をどうやって効率化したのかというものです．</a:t>
+              <a:t>文字列を差し替えるだけの単純な機能ですが，これのおかげでテーブルやカラムの名前変更が可能になりました．</a:t>
             </a:r>
             <a:endParaRPr kumimoji="1" lang="ja-JP" altLang="en-US" dirty="0"/>
           </a:p>
@@ -5509,7 +5504,7 @@
             <a:fld id="{82B770F3-4A5E-4127-9297-278B18C89B74}" type="slidenum">
               <a:rPr kumimoji="1" lang="ja-JP" altLang="en-US" smtClean="0"/>
               <a:pPr/>
-              <a:t>13</a:t>
+              <a:t>11</a:t>
             </a:fld>
             <a:endParaRPr kumimoji="1" lang="ja-JP" altLang="en-US"/>
           </a:p>
@@ -5569,18 +5564,6 @@
           </a:bodyPr>
           <a:lstStyle/>
           <a:p>
-            <a:r>
-              <a:rPr kumimoji="1" lang="ja-JP" altLang="en-US" dirty="0" smtClean="0"/>
-              <a:t>ベンチマークに入ります</a:t>
-            </a:r>
-            <a:r>
-              <a:rPr kumimoji="1" lang="ja-JP" altLang="en-US" dirty="0" err="1" smtClean="0"/>
-              <a:t>よの</a:t>
-            </a:r>
-            <a:r>
-              <a:rPr kumimoji="1" lang="ja-JP" altLang="en-US" dirty="0" smtClean="0"/>
-              <a:t>合図です．</a:t>
-            </a:r>
             <a:endParaRPr kumimoji="1" lang="ja-JP" altLang="en-US" dirty="0"/>
           </a:p>
         </p:txBody>
@@ -5603,7 +5586,7 @@
             <a:fld id="{82B770F3-4A5E-4127-9297-278B18C89B74}" type="slidenum">
               <a:rPr kumimoji="1" lang="ja-JP" altLang="en-US" smtClean="0"/>
               <a:pPr/>
-              <a:t>15</a:t>
+              <a:t>12</a:t>
             </a:fld>
             <a:endParaRPr kumimoji="1" lang="ja-JP" altLang="en-US"/>
           </a:p>
@@ -5665,24 +5648,17 @@
           <a:p>
             <a:r>
               <a:rPr kumimoji="1" lang="ja-JP" altLang="en-US" dirty="0" smtClean="0"/>
-              <a:t>日本語 </a:t>
+              <a:t>参考資料に書いてある内容は，本来は参照ロックフリーでないダブル配列をどうやって参照ロックフリーにしたのか，参照ロックフリーにすることで悪化した更新効率をどうやって補っているのか，ダブル配列の苦手な </a:t>
             </a:r>
             <a:r>
               <a:rPr kumimoji="1" lang="en-US" altLang="ja-JP" dirty="0" smtClean="0"/>
-              <a:t>Wikipedia </a:t>
+              <a:t>Predictive Search</a:t>
             </a:r>
             <a:r>
               <a:rPr kumimoji="1" lang="ja-JP" altLang="en-US" dirty="0" smtClean="0"/>
-              <a:t>のタイトル一覧を利用しました．</a:t>
-            </a:r>
-            <a:endParaRPr kumimoji="1" lang="en-US" altLang="ja-JP" dirty="0" smtClean="0"/>
-          </a:p>
-          <a:p>
-            <a:r>
-              <a:rPr lang="ja-JP" altLang="en-US" dirty="0" smtClean="0"/>
-              <a:t>ウィキペディア創設者ジミー・ウェールズからのお願いを無下にすることはできません．</a:t>
-            </a:r>
-            <a:endParaRPr lang="en-US" altLang="ja-JP" dirty="0" smtClean="0"/>
+              <a:t> をどうやって効率化したのかというものです．</a:t>
+            </a:r>
+            <a:endParaRPr kumimoji="1" lang="ja-JP" altLang="en-US" dirty="0"/>
           </a:p>
         </p:txBody>
       </p:sp>
@@ -5704,7 +5680,7 @@
             <a:fld id="{82B770F3-4A5E-4127-9297-278B18C89B74}" type="slidenum">
               <a:rPr kumimoji="1" lang="ja-JP" altLang="en-US" smtClean="0"/>
               <a:pPr/>
-              <a:t>16</a:t>
+              <a:t>13</a:t>
             </a:fld>
             <a:endParaRPr kumimoji="1" lang="ja-JP" altLang="en-US"/>
           </a:p>
@@ -5764,46 +5740,7 @@
           </a:bodyPr>
           <a:lstStyle/>
           <a:p>
-            <a:r>
-              <a:rPr kumimoji="1" lang="en-US" altLang="ja-JP" dirty="0" err="1" smtClean="0"/>
-              <a:t>grn_dat</a:t>
-            </a:r>
-            <a:r>
-              <a:rPr kumimoji="1" lang="ja-JP" altLang="en-US" dirty="0" smtClean="0"/>
-              <a:t> は </a:t>
-            </a:r>
-            <a:r>
-              <a:rPr kumimoji="1" lang="en-US" altLang="ja-JP" dirty="0" err="1" smtClean="0"/>
-              <a:t>grn_pat</a:t>
-            </a:r>
-            <a:r>
-              <a:rPr kumimoji="1" lang="ja-JP" altLang="en-US" baseline="0" dirty="0" smtClean="0"/>
-              <a:t> の代替としての役割を持つので，</a:t>
-            </a:r>
-            <a:r>
-              <a:rPr kumimoji="1" lang="en-US" altLang="ja-JP" baseline="0" dirty="0" err="1" smtClean="0"/>
-              <a:t>grn_pat</a:t>
-            </a:r>
-            <a:r>
-              <a:rPr kumimoji="1" lang="ja-JP" altLang="en-US" baseline="0" dirty="0" smtClean="0"/>
-              <a:t>（青）と </a:t>
-            </a:r>
-            <a:r>
-              <a:rPr kumimoji="1" lang="en-US" altLang="ja-JP" baseline="0" dirty="0" err="1" smtClean="0"/>
-              <a:t>grn_dat</a:t>
-            </a:r>
-            <a:r>
-              <a:rPr kumimoji="1" lang="ja-JP" altLang="en-US" baseline="0" dirty="0" smtClean="0"/>
-              <a:t>（緑）を比較してください．</a:t>
-            </a:r>
-            <a:endParaRPr kumimoji="1" lang="en-US" altLang="ja-JP" baseline="0" dirty="0" smtClean="0"/>
-          </a:p>
-          <a:p>
-            <a:r>
-              <a:rPr kumimoji="1" lang="ja-JP" altLang="en-US" baseline="0" dirty="0" smtClean="0"/>
-              <a:t>下にあるほど高速です．</a:t>
-            </a:r>
-            <a:endParaRPr kumimoji="1" lang="ja-JP" altLang="en-US" dirty="0"/>
+            <a:endParaRPr kumimoji="1" lang="ja-JP" altLang="en-US"/>
           </a:p>
         </p:txBody>
       </p:sp>
@@ -5825,7 +5762,7 @@
             <a:fld id="{82B770F3-4A5E-4127-9297-278B18C89B74}" type="slidenum">
               <a:rPr kumimoji="1" lang="ja-JP" altLang="en-US" smtClean="0"/>
               <a:pPr/>
-              <a:t>17</a:t>
+              <a:t>14</a:t>
             </a:fld>
             <a:endParaRPr kumimoji="1" lang="ja-JP" altLang="en-US"/>
           </a:p>
@@ -5886,16 +5823,16 @@
           <a:lstStyle/>
           <a:p>
             <a:r>
-              <a:rPr kumimoji="1" lang="en-US" altLang="ja-JP" dirty="0" err="1" smtClean="0"/>
-              <a:t>grn_dat</a:t>
-            </a:r>
-            <a:r>
-              <a:rPr kumimoji="1" lang="en-US" altLang="ja-JP" dirty="0" smtClean="0"/>
-              <a:t> </a:t>
-            </a:r>
-            <a:r>
               <a:rPr kumimoji="1" lang="ja-JP" altLang="en-US" dirty="0" smtClean="0"/>
-              <a:t>は参照の割合が多い用途に使いましょうということを示す実験結果です．</a:t>
+              <a:t>ベンチマークに入ります</a:t>
+            </a:r>
+            <a:r>
+              <a:rPr kumimoji="1" lang="ja-JP" altLang="en-US" dirty="0" err="1" smtClean="0"/>
+              <a:t>よの</a:t>
+            </a:r>
+            <a:r>
+              <a:rPr kumimoji="1" lang="ja-JP" altLang="en-US" dirty="0" smtClean="0"/>
+              <a:t>合図です．</a:t>
             </a:r>
             <a:endParaRPr kumimoji="1" lang="ja-JP" altLang="en-US" dirty="0"/>
           </a:p>
@@ -5919,7 +5856,7 @@
             <a:fld id="{82B770F3-4A5E-4127-9297-278B18C89B74}" type="slidenum">
               <a:rPr kumimoji="1" lang="ja-JP" altLang="en-US" smtClean="0"/>
               <a:pPr/>
-              <a:t>18</a:t>
+              <a:t>15</a:t>
             </a:fld>
             <a:endParaRPr kumimoji="1" lang="ja-JP" altLang="en-US"/>
           </a:p>
@@ -5981,17 +5918,24 @@
           <a:p>
             <a:r>
               <a:rPr kumimoji="1" lang="ja-JP" altLang="en-US" dirty="0" smtClean="0"/>
-              <a:t>メモリ消費が気になるときは </a:t>
-            </a:r>
-            <a:r>
-              <a:rPr kumimoji="1" lang="en-US" altLang="ja-JP" dirty="0" err="1" smtClean="0"/>
-              <a:t>grn_pat</a:t>
+              <a:t>日本語 </a:t>
+            </a:r>
+            <a:r>
+              <a:rPr kumimoji="1" lang="en-US" altLang="ja-JP" dirty="0" smtClean="0"/>
+              <a:t>Wikipedia </a:t>
             </a:r>
             <a:r>
               <a:rPr kumimoji="1" lang="ja-JP" altLang="en-US" dirty="0" smtClean="0"/>
-              <a:t> を使った方がいいですよということを示す実験結果です．</a:t>
-            </a:r>
-            <a:endParaRPr kumimoji="1" lang="ja-JP" altLang="en-US" dirty="0"/>
+              <a:t>のタイトル一覧を利用しました．</a:t>
+            </a:r>
+            <a:endParaRPr kumimoji="1" lang="en-US" altLang="ja-JP" dirty="0" smtClean="0"/>
+          </a:p>
+          <a:p>
+            <a:r>
+              <a:rPr lang="ja-JP" altLang="en-US" dirty="0" smtClean="0"/>
+              <a:t>ウィキペディア創設者ジミー・ウェールズからのお願いを無下にすることはできません．</a:t>
+            </a:r>
+            <a:endParaRPr lang="en-US" altLang="ja-JP" dirty="0" smtClean="0"/>
           </a:p>
         </p:txBody>
       </p:sp>
@@ -6013,7 +5957,7 @@
             <a:fld id="{82B770F3-4A5E-4127-9297-278B18C89B74}" type="slidenum">
               <a:rPr kumimoji="1" lang="ja-JP" altLang="en-US" smtClean="0"/>
               <a:pPr/>
-              <a:t>19</a:t>
+              <a:t>16</a:t>
             </a:fld>
             <a:endParaRPr kumimoji="1" lang="ja-JP" altLang="en-US"/>
           </a:p>
@@ -6054,7 +5998,12 @@
             <p:ph type="sldImg"/>
           </p:nvPr>
         </p:nvSpPr>
-        <p:spPr/>
+        <p:spPr>
+          <a:xfrm>
+            <a:off x="693738" y="685800"/>
+            <a:ext cx="5470525" cy="4103688"/>
+          </a:xfrm>
+        </p:spPr>
       </p:sp>
       <p:sp>
         <p:nvSpPr>
@@ -6073,6 +6022,45 @@
           </a:bodyPr>
           <a:lstStyle/>
           <a:p>
+            <a:r>
+              <a:rPr kumimoji="1" lang="en-US" altLang="ja-JP" dirty="0" err="1" smtClean="0"/>
+              <a:t>grn_dat</a:t>
+            </a:r>
+            <a:r>
+              <a:rPr kumimoji="1" lang="ja-JP" altLang="en-US" dirty="0" smtClean="0"/>
+              <a:t> は </a:t>
+            </a:r>
+            <a:r>
+              <a:rPr kumimoji="1" lang="en-US" altLang="ja-JP" dirty="0" err="1" smtClean="0"/>
+              <a:t>grn_pat</a:t>
+            </a:r>
+            <a:r>
+              <a:rPr kumimoji="1" lang="ja-JP" altLang="en-US" baseline="0" dirty="0" smtClean="0"/>
+              <a:t> の代替としての役割を持つので，</a:t>
+            </a:r>
+            <a:r>
+              <a:rPr kumimoji="1" lang="en-US" altLang="ja-JP" baseline="0" dirty="0" err="1" smtClean="0"/>
+              <a:t>grn_pat</a:t>
+            </a:r>
+            <a:r>
+              <a:rPr kumimoji="1" lang="ja-JP" altLang="en-US" baseline="0" dirty="0" smtClean="0"/>
+              <a:t>（青）と </a:t>
+            </a:r>
+            <a:r>
+              <a:rPr kumimoji="1" lang="en-US" altLang="ja-JP" baseline="0" dirty="0" err="1" smtClean="0"/>
+              <a:t>grn_dat</a:t>
+            </a:r>
+            <a:r>
+              <a:rPr kumimoji="1" lang="ja-JP" altLang="en-US" baseline="0" dirty="0" smtClean="0"/>
+              <a:t>（緑）を比較してください．</a:t>
+            </a:r>
+            <a:endParaRPr kumimoji="1" lang="en-US" altLang="ja-JP" baseline="0" dirty="0" smtClean="0"/>
+          </a:p>
+          <a:p>
+            <a:r>
+              <a:rPr kumimoji="1" lang="ja-JP" altLang="en-US" baseline="0" dirty="0" smtClean="0"/>
+              <a:t>下にあるほど高速です．</a:t>
+            </a:r>
             <a:endParaRPr kumimoji="1" lang="ja-JP" altLang="en-US" dirty="0"/>
           </a:p>
         </p:txBody>
@@ -6095,7 +6083,7 @@
             <a:fld id="{82B770F3-4A5E-4127-9297-278B18C89B74}" type="slidenum">
               <a:rPr kumimoji="1" lang="ja-JP" altLang="en-US" smtClean="0"/>
               <a:pPr/>
-              <a:t>24</a:t>
+              <a:t>17</a:t>
             </a:fld>
             <a:endParaRPr kumimoji="1" lang="ja-JP" altLang="en-US"/>
           </a:p>
@@ -6136,7 +6124,12 @@
             <p:ph type="sldImg"/>
           </p:nvPr>
         </p:nvSpPr>
-        <p:spPr/>
+        <p:spPr>
+          <a:xfrm>
+            <a:off x="693738" y="685800"/>
+            <a:ext cx="5470525" cy="4103688"/>
+          </a:xfrm>
+        </p:spPr>
       </p:sp>
       <p:sp>
         <p:nvSpPr>
@@ -6156,24 +6149,16 @@
           <a:lstStyle/>
           <a:p>
             <a:r>
+              <a:rPr kumimoji="1" lang="en-US" altLang="ja-JP" dirty="0" err="1" smtClean="0"/>
+              <a:t>grn_dat</a:t>
+            </a:r>
+            <a:r>
+              <a:rPr kumimoji="1" lang="en-US" altLang="ja-JP" dirty="0" smtClean="0"/>
+              <a:t> </a:t>
+            </a:r>
+            <a:r>
               <a:rPr kumimoji="1" lang="ja-JP" altLang="en-US" dirty="0" smtClean="0"/>
-              <a:t>前文検索に用いる索引語を登録する場合，どうしても偏りが大きくなるので，それを利用すれば </a:t>
-            </a:r>
-            <a:r>
-              <a:rPr kumimoji="1" lang="en-US" altLang="ja-JP" dirty="0" err="1" smtClean="0"/>
-              <a:t>grn_pat</a:t>
-            </a:r>
-            <a:r>
-              <a:rPr kumimoji="1" lang="ja-JP" altLang="en-US" dirty="0" smtClean="0"/>
-              <a:t> とキャッシュの組み合わせで </a:t>
-            </a:r>
-            <a:r>
-              <a:rPr kumimoji="1" lang="en-US" altLang="ja-JP" dirty="0" err="1" smtClean="0"/>
-              <a:t>grn_hash</a:t>
-            </a:r>
-            <a:r>
-              <a:rPr kumimoji="1" lang="ja-JP" altLang="en-US" dirty="0" smtClean="0"/>
-              <a:t> 並みの性能が出せるはずという案です．</a:t>
+              <a:t>は参照の割合が多い用途に使いましょうということを示す実験結果です．</a:t>
             </a:r>
             <a:endParaRPr kumimoji="1" lang="ja-JP" altLang="en-US" dirty="0"/>
           </a:p>
@@ -6197,7 +6182,7 @@
             <a:fld id="{82B770F3-4A5E-4127-9297-278B18C89B74}" type="slidenum">
               <a:rPr kumimoji="1" lang="ja-JP" altLang="en-US" smtClean="0"/>
               <a:pPr/>
-              <a:t>25</a:t>
+              <a:t>18</a:t>
             </a:fld>
             <a:endParaRPr kumimoji="1" lang="ja-JP" altLang="en-US"/>
           </a:p>
@@ -6238,7 +6223,12 @@
             <p:ph type="sldImg"/>
           </p:nvPr>
         </p:nvSpPr>
-        <p:spPr/>
+        <p:spPr>
+          <a:xfrm>
+            <a:off x="693738" y="685800"/>
+            <a:ext cx="5470525" cy="4103688"/>
+          </a:xfrm>
+        </p:spPr>
       </p:sp>
       <p:sp>
         <p:nvSpPr>
@@ -6257,6 +6247,18 @@
           </a:bodyPr>
           <a:lstStyle/>
           <a:p>
+            <a:r>
+              <a:rPr kumimoji="1" lang="ja-JP" altLang="en-US" dirty="0" smtClean="0"/>
+              <a:t>メモリ消費が気になるときは </a:t>
+            </a:r>
+            <a:r>
+              <a:rPr kumimoji="1" lang="en-US" altLang="ja-JP" dirty="0" err="1" smtClean="0"/>
+              <a:t>grn_pat</a:t>
+            </a:r>
+            <a:r>
+              <a:rPr kumimoji="1" lang="ja-JP" altLang="en-US" dirty="0" smtClean="0"/>
+              <a:t> を使った方がいいですよということを示す実験結果です．</a:t>
+            </a:r>
             <a:endParaRPr kumimoji="1" lang="ja-JP" altLang="en-US" dirty="0"/>
           </a:p>
         </p:txBody>
@@ -6279,7 +6281,7 @@
             <a:fld id="{82B770F3-4A5E-4127-9297-278B18C89B74}" type="slidenum">
               <a:rPr kumimoji="1" lang="ja-JP" altLang="en-US" smtClean="0"/>
               <a:pPr/>
-              <a:t>26</a:t>
+              <a:t>19</a:t>
             </a:fld>
             <a:endParaRPr kumimoji="1" lang="ja-JP" altLang="en-US"/>
           </a:p>
@@ -6339,6 +6341,30 @@
           </a:bodyPr>
           <a:lstStyle/>
           <a:p>
+            <a:r>
+              <a:rPr kumimoji="1" lang="ja-JP" altLang="en-US" dirty="0" smtClean="0"/>
+              <a:t>正確には以前のバージョンにも </a:t>
+            </a:r>
+            <a:r>
+              <a:rPr kumimoji="1" lang="en-US" altLang="ja-JP" dirty="0" err="1" smtClean="0"/>
+              <a:t>grn_dat</a:t>
+            </a:r>
+            <a:r>
+              <a:rPr kumimoji="1" lang="ja-JP" altLang="en-US" dirty="0" smtClean="0"/>
+              <a:t> のコードは入っていたのですが，現在の仕様になり，実用に供されるようになったのは </a:t>
+            </a:r>
+            <a:r>
+              <a:rPr kumimoji="1" lang="en-US" altLang="ja-JP" dirty="0" err="1" smtClean="0"/>
+              <a:t>groonga</a:t>
+            </a:r>
+            <a:r>
+              <a:rPr kumimoji="1" lang="en-US" altLang="ja-JP" dirty="0" smtClean="0"/>
+              <a:t> 1.2.8</a:t>
+            </a:r>
+            <a:r>
+              <a:rPr kumimoji="1" lang="ja-JP" altLang="en-US" dirty="0" smtClean="0"/>
+              <a:t> からです．</a:t>
+            </a:r>
             <a:endParaRPr kumimoji="1" lang="ja-JP" altLang="en-US" dirty="0"/>
           </a:p>
         </p:txBody>
@@ -6361,7 +6387,7 @@
             <a:fld id="{82B770F3-4A5E-4127-9297-278B18C89B74}" type="slidenum">
               <a:rPr kumimoji="1" lang="ja-JP" altLang="en-US" smtClean="0"/>
               <a:pPr/>
-              <a:t>3</a:t>
+              <a:t>2</a:t>
             </a:fld>
             <a:endParaRPr kumimoji="1" lang="ja-JP" altLang="en-US"/>
           </a:p>
@@ -6421,42 +6447,7 @@
           </a:bodyPr>
           <a:lstStyle/>
           <a:p>
-            <a:r>
-              <a:rPr kumimoji="1" lang="ja-JP" altLang="en-US" dirty="0" smtClean="0"/>
-              <a:t>小規模な </a:t>
-            </a:r>
-            <a:r>
-              <a:rPr kumimoji="1" lang="en-US" altLang="ja-JP" dirty="0" err="1" smtClean="0"/>
-              <a:t>grn_hash</a:t>
-            </a:r>
-            <a:r>
-              <a:rPr kumimoji="1" lang="ja-JP" altLang="en-US" dirty="0" smtClean="0"/>
-              <a:t> の構築時間が長くなっている部分は原因がほぼ特定されているので，改良の余地がありそうだという案です．</a:t>
-            </a:r>
-            <a:endParaRPr kumimoji="1" lang="en-US" altLang="ja-JP" dirty="0" smtClean="0"/>
-          </a:p>
-          <a:p>
-            <a:r>
-              <a:rPr kumimoji="1" lang="ja-JP" altLang="en-US" dirty="0" smtClean="0"/>
-              <a:t>検索の途中経過なんかも </a:t>
-            </a:r>
-            <a:r>
-              <a:rPr kumimoji="1" lang="en-US" altLang="ja-JP" dirty="0" err="1" smtClean="0"/>
-              <a:t>grn_hash</a:t>
-            </a:r>
-            <a:r>
-              <a:rPr kumimoji="1" lang="ja-JP" altLang="en-US" dirty="0" smtClean="0"/>
-              <a:t> </a:t>
-            </a:r>
-            <a:r>
-              <a:rPr kumimoji="1" lang="ja-JP" altLang="en-US" dirty="0" err="1" smtClean="0"/>
-              <a:t>に保</a:t>
-            </a:r>
-            <a:r>
-              <a:rPr kumimoji="1" lang="ja-JP" altLang="en-US" dirty="0" smtClean="0"/>
-              <a:t>存しているので，全体的な性能に影響するのではないかと考えています．</a:t>
-            </a:r>
-            <a:endParaRPr kumimoji="1" lang="ja-JP" altLang="en-US" dirty="0"/>
+            <a:endParaRPr kumimoji="1" lang="ja-JP" altLang="en-US"/>
           </a:p>
         </p:txBody>
       </p:sp>
@@ -6478,7 +6469,7 @@
             <a:fld id="{82B770F3-4A5E-4127-9297-278B18C89B74}" type="slidenum">
               <a:rPr kumimoji="1" lang="ja-JP" altLang="en-US" smtClean="0"/>
               <a:pPr/>
-              <a:t>27</a:t>
+              <a:t>20</a:t>
             </a:fld>
             <a:endParaRPr kumimoji="1" lang="ja-JP" altLang="en-US"/>
           </a:p>
@@ -6538,11 +6529,7 @@
           </a:bodyPr>
           <a:lstStyle/>
           <a:p>
-            <a:r>
-              <a:rPr kumimoji="1" lang="ja-JP" altLang="en-US" dirty="0" smtClean="0"/>
-              <a:t>更新不可で参照も遅い代わりに桁違いにコンパクトなデータ構造があるので，それらを上手く利用できれば無駄をなくすことができるのではないかという案です．</a:t>
-            </a:r>
-            <a:endParaRPr kumimoji="1" lang="ja-JP" altLang="en-US" dirty="0"/>
+            <a:endParaRPr kumimoji="1" lang="ja-JP" altLang="en-US"/>
           </a:p>
         </p:txBody>
       </p:sp>
@@ -6564,7 +6551,7 @@
             <a:fld id="{82B770F3-4A5E-4127-9297-278B18C89B74}" type="slidenum">
               <a:rPr kumimoji="1" lang="ja-JP" altLang="en-US" smtClean="0"/>
               <a:pPr/>
-              <a:t>29</a:t>
+              <a:t>21</a:t>
             </a:fld>
             <a:endParaRPr kumimoji="1" lang="ja-JP" altLang="en-US"/>
           </a:p>
@@ -6624,35 +6611,7 @@
           </a:bodyPr>
           <a:lstStyle/>
           <a:p>
-            <a:r>
-              <a:rPr kumimoji="1" lang="ja-JP" altLang="en-US" dirty="0" smtClean="0"/>
-              <a:t>今回は </a:t>
-            </a:r>
-            <a:r>
-              <a:rPr kumimoji="1" lang="en-US" altLang="ja-JP" dirty="0" err="1" smtClean="0"/>
-              <a:t>grn_dat</a:t>
-            </a:r>
-            <a:r>
-              <a:rPr kumimoji="1" lang="ja-JP" altLang="en-US" dirty="0" smtClean="0"/>
-              <a:t> をメインに持ってきたので，</a:t>
-            </a:r>
-            <a:r>
-              <a:rPr kumimoji="1" lang="en-US" altLang="ja-JP" dirty="0" err="1" smtClean="0"/>
-              <a:t>grn_pat</a:t>
-            </a:r>
-            <a:r>
-              <a:rPr kumimoji="1" lang="en-US" altLang="ja-JP" dirty="0" smtClean="0"/>
-              <a:t>/hash/</a:t>
-            </a:r>
-            <a:r>
-              <a:rPr kumimoji="1" lang="en-US" altLang="ja-JP" dirty="0" err="1" smtClean="0"/>
-              <a:t>dat</a:t>
-            </a:r>
-            <a:r>
-              <a:rPr kumimoji="1" lang="ja-JP" altLang="en-US" dirty="0" smtClean="0"/>
-              <a:t> に関する内容に絞りました．</a:t>
-            </a:r>
-            <a:endParaRPr kumimoji="1" lang="ja-JP" altLang="en-US" dirty="0"/>
+            <a:endParaRPr kumimoji="1" lang="ja-JP" altLang="en-US"/>
           </a:p>
         </p:txBody>
       </p:sp>
@@ -6674,7 +6633,7 @@
             <a:fld id="{82B770F3-4A5E-4127-9297-278B18C89B74}" type="slidenum">
               <a:rPr kumimoji="1" lang="ja-JP" altLang="en-US" smtClean="0"/>
               <a:pPr/>
-              <a:t>31</a:t>
+              <a:t>22</a:t>
             </a:fld>
             <a:endParaRPr kumimoji="1" lang="ja-JP" altLang="en-US"/>
           </a:p>
@@ -6734,6 +6693,88 @@
           </a:bodyPr>
           <a:lstStyle/>
           <a:p>
+            <a:endParaRPr kumimoji="1" lang="ja-JP" altLang="en-US"/>
+          </a:p>
+        </p:txBody>
+      </p:sp>
+      <p:sp>
+        <p:nvSpPr>
+          <p:cNvPr id="4" name="スライド番号プレースホルダ 3"/>
+          <p:cNvSpPr>
+            <a:spLocks noGrp="1"/>
+          </p:cNvSpPr>
+          <p:nvPr>
+            <p:ph type="sldNum" sz="quarter" idx="10"/>
+          </p:nvPr>
+        </p:nvSpPr>
+        <p:spPr/>
+        <p:txBody>
+          <a:bodyPr/>
+          <a:lstStyle/>
+          <a:p>
+            <a:fld id="{82B770F3-4A5E-4127-9297-278B18C89B74}" type="slidenum">
+              <a:rPr kumimoji="1" lang="ja-JP" altLang="en-US" smtClean="0"/>
+              <a:pPr/>
+              <a:t>23</a:t>
+            </a:fld>
+            <a:endParaRPr kumimoji="1" lang="ja-JP" altLang="en-US"/>
+          </a:p>
+        </p:txBody>
+      </p:sp>
+    </p:spTree>
+  </p:cSld>
+  <p:clrMapOvr>
+    <a:masterClrMapping/>
+  </p:clrMapOvr>
+</p:notes>
+</file>
+
+<file path=ppt/notesSlides/notesSlide24.xml><?xml version="1.0" encoding="utf-8"?>
+<p:notes xmlns:a="http://schemas.openxmlformats.org/drawingml/2006/main" xmlns:r="http://schemas.openxmlformats.org/officeDocument/2006/relationships" xmlns:p="http://schemas.openxmlformats.org/presentationml/2006/main">
+  <p:cSld>
+    <p:spTree>
+      <p:nvGrpSpPr>
+        <p:cNvPr id="1" name=""/>
+        <p:cNvGrpSpPr/>
+        <p:nvPr/>
+      </p:nvGrpSpPr>
+      <p:grpSpPr>
+        <a:xfrm>
+          <a:off x="0" y="0"/>
+          <a:ext cx="0" cy="0"/>
+          <a:chOff x="0" y="0"/>
+          <a:chExt cx="0" cy="0"/>
+        </a:xfrm>
+      </p:grpSpPr>
+      <p:sp>
+        <p:nvSpPr>
+          <p:cNvPr id="2" name="スライド イメージ プレースホルダ 1"/>
+          <p:cNvSpPr>
+            <a:spLocks noGrp="1" noRot="1" noChangeAspect="1"/>
+          </p:cNvSpPr>
+          <p:nvPr>
+            <p:ph type="sldImg"/>
+          </p:nvPr>
+        </p:nvSpPr>
+        <p:spPr/>
+      </p:sp>
+      <p:sp>
+        <p:nvSpPr>
+          <p:cNvPr id="3" name="ノート プレースホルダ 2"/>
+          <p:cNvSpPr>
+            <a:spLocks noGrp="1"/>
+          </p:cNvSpPr>
+          <p:nvPr>
+            <p:ph type="body" idx="1"/>
+          </p:nvPr>
+        </p:nvSpPr>
+        <p:spPr/>
+        <p:txBody>
+          <a:bodyPr>
+            <a:normAutofit/>
+          </a:bodyPr>
+          <a:lstStyle/>
+          <a:p>
             <a:endParaRPr kumimoji="1" lang="ja-JP" altLang="en-US" dirty="0"/>
           </a:p>
         </p:txBody>
@@ -6756,7 +6797,495 @@
             <a:fld id="{82B770F3-4A5E-4127-9297-278B18C89B74}" type="slidenum">
               <a:rPr kumimoji="1" lang="ja-JP" altLang="en-US" smtClean="0"/>
               <a:pPr/>
-              <a:t>32</a:t>
+              <a:t>24</a:t>
+            </a:fld>
+            <a:endParaRPr kumimoji="1" lang="ja-JP" altLang="en-US"/>
+          </a:p>
+        </p:txBody>
+      </p:sp>
+    </p:spTree>
+  </p:cSld>
+  <p:clrMapOvr>
+    <a:masterClrMapping/>
+  </p:clrMapOvr>
+</p:notes>
+</file>
+
+<file path=ppt/notesSlides/notesSlide25.xml><?xml version="1.0" encoding="utf-8"?>
+<p:notes xmlns:a="http://schemas.openxmlformats.org/drawingml/2006/main" xmlns:r="http://schemas.openxmlformats.org/officeDocument/2006/relationships" xmlns:p="http://schemas.openxmlformats.org/presentationml/2006/main">
+  <p:cSld>
+    <p:spTree>
+      <p:nvGrpSpPr>
+        <p:cNvPr id="1" name=""/>
+        <p:cNvGrpSpPr/>
+        <p:nvPr/>
+      </p:nvGrpSpPr>
+      <p:grpSpPr>
+        <a:xfrm>
+          <a:off x="0" y="0"/>
+          <a:ext cx="0" cy="0"/>
+          <a:chOff x="0" y="0"/>
+          <a:chExt cx="0" cy="0"/>
+        </a:xfrm>
+      </p:grpSpPr>
+      <p:sp>
+        <p:nvSpPr>
+          <p:cNvPr id="2" name="スライド イメージ プレースホルダ 1"/>
+          <p:cNvSpPr>
+            <a:spLocks noGrp="1" noRot="1" noChangeAspect="1"/>
+          </p:cNvSpPr>
+          <p:nvPr>
+            <p:ph type="sldImg"/>
+          </p:nvPr>
+        </p:nvSpPr>
+        <p:spPr>
+          <a:xfrm>
+            <a:off x="693738" y="685800"/>
+            <a:ext cx="5470525" cy="4103688"/>
+          </a:xfrm>
+        </p:spPr>
+      </p:sp>
+      <p:sp>
+        <p:nvSpPr>
+          <p:cNvPr id="3" name="ノート プレースホルダ 2"/>
+          <p:cNvSpPr>
+            <a:spLocks noGrp="1"/>
+          </p:cNvSpPr>
+          <p:nvPr>
+            <p:ph type="body" idx="1"/>
+          </p:nvPr>
+        </p:nvSpPr>
+        <p:spPr/>
+        <p:txBody>
+          <a:bodyPr>
+            <a:normAutofit/>
+          </a:bodyPr>
+          <a:lstStyle/>
+          <a:p>
+            <a:r>
+              <a:rPr kumimoji="1" lang="ja-JP" altLang="en-US" smtClean="0"/>
+              <a:t>全文検索</a:t>
+            </a:r>
+            <a:r>
+              <a:rPr kumimoji="1" lang="ja-JP" altLang="en-US" dirty="0" smtClean="0"/>
+              <a:t>に用いる索引語を登録する場合，どうしても偏りが大きくなるので，それを利用すれば </a:t>
+            </a:r>
+            <a:r>
+              <a:rPr kumimoji="1" lang="en-US" altLang="ja-JP" dirty="0" err="1" smtClean="0"/>
+              <a:t>grn_pat</a:t>
+            </a:r>
+            <a:r>
+              <a:rPr kumimoji="1" lang="ja-JP" altLang="en-US" dirty="0" smtClean="0"/>
+              <a:t> とキャッシュの組み合わせで </a:t>
+            </a:r>
+            <a:r>
+              <a:rPr kumimoji="1" lang="en-US" altLang="ja-JP" dirty="0" err="1" smtClean="0"/>
+              <a:t>grn_hash</a:t>
+            </a:r>
+            <a:r>
+              <a:rPr kumimoji="1" lang="ja-JP" altLang="en-US" dirty="0" smtClean="0"/>
+              <a:t> 並みの性能が出せるはずという案です．</a:t>
+            </a:r>
+            <a:endParaRPr kumimoji="1" lang="ja-JP" altLang="en-US" dirty="0"/>
+          </a:p>
+        </p:txBody>
+      </p:sp>
+      <p:sp>
+        <p:nvSpPr>
+          <p:cNvPr id="4" name="スライド番号プレースホルダ 3"/>
+          <p:cNvSpPr>
+            <a:spLocks noGrp="1"/>
+          </p:cNvSpPr>
+          <p:nvPr>
+            <p:ph type="sldNum" sz="quarter" idx="10"/>
+          </p:nvPr>
+        </p:nvSpPr>
+        <p:spPr/>
+        <p:txBody>
+          <a:bodyPr/>
+          <a:lstStyle/>
+          <a:p>
+            <a:fld id="{82B770F3-4A5E-4127-9297-278B18C89B74}" type="slidenum">
+              <a:rPr kumimoji="1" lang="ja-JP" altLang="en-US" smtClean="0"/>
+              <a:pPr/>
+              <a:t>25</a:t>
+            </a:fld>
+            <a:endParaRPr kumimoji="1" lang="ja-JP" altLang="en-US"/>
+          </a:p>
+        </p:txBody>
+      </p:sp>
+    </p:spTree>
+  </p:cSld>
+  <p:clrMapOvr>
+    <a:masterClrMapping/>
+  </p:clrMapOvr>
+</p:notes>
+</file>
+
+<file path=ppt/notesSlides/notesSlide26.xml><?xml version="1.0" encoding="utf-8"?>
+<p:notes xmlns:a="http://schemas.openxmlformats.org/drawingml/2006/main" xmlns:r="http://schemas.openxmlformats.org/officeDocument/2006/relationships" xmlns:p="http://schemas.openxmlformats.org/presentationml/2006/main">
+  <p:cSld>
+    <p:spTree>
+      <p:nvGrpSpPr>
+        <p:cNvPr id="1" name=""/>
+        <p:cNvGrpSpPr/>
+        <p:nvPr/>
+      </p:nvGrpSpPr>
+      <p:grpSpPr>
+        <a:xfrm>
+          <a:off x="0" y="0"/>
+          <a:ext cx="0" cy="0"/>
+          <a:chOff x="0" y="0"/>
+          <a:chExt cx="0" cy="0"/>
+        </a:xfrm>
+      </p:grpSpPr>
+      <p:sp>
+        <p:nvSpPr>
+          <p:cNvPr id="2" name="スライド イメージ プレースホルダ 1"/>
+          <p:cNvSpPr>
+            <a:spLocks noGrp="1" noRot="1" noChangeAspect="1"/>
+          </p:cNvSpPr>
+          <p:nvPr>
+            <p:ph type="sldImg"/>
+          </p:nvPr>
+        </p:nvSpPr>
+        <p:spPr/>
+      </p:sp>
+      <p:sp>
+        <p:nvSpPr>
+          <p:cNvPr id="3" name="ノート プレースホルダ 2"/>
+          <p:cNvSpPr>
+            <a:spLocks noGrp="1"/>
+          </p:cNvSpPr>
+          <p:nvPr>
+            <p:ph type="body" idx="1"/>
+          </p:nvPr>
+        </p:nvSpPr>
+        <p:spPr/>
+        <p:txBody>
+          <a:bodyPr>
+            <a:normAutofit/>
+          </a:bodyPr>
+          <a:lstStyle/>
+          <a:p>
+            <a:endParaRPr kumimoji="1" lang="ja-JP" altLang="en-US" dirty="0"/>
+          </a:p>
+        </p:txBody>
+      </p:sp>
+      <p:sp>
+        <p:nvSpPr>
+          <p:cNvPr id="4" name="スライド番号プレースホルダ 3"/>
+          <p:cNvSpPr>
+            <a:spLocks noGrp="1"/>
+          </p:cNvSpPr>
+          <p:nvPr>
+            <p:ph type="sldNum" sz="quarter" idx="10"/>
+          </p:nvPr>
+        </p:nvSpPr>
+        <p:spPr/>
+        <p:txBody>
+          <a:bodyPr/>
+          <a:lstStyle/>
+          <a:p>
+            <a:fld id="{82B770F3-4A5E-4127-9297-278B18C89B74}" type="slidenum">
+              <a:rPr kumimoji="1" lang="ja-JP" altLang="en-US" smtClean="0"/>
+              <a:pPr/>
+              <a:t>26</a:t>
+            </a:fld>
+            <a:endParaRPr kumimoji="1" lang="ja-JP" altLang="en-US"/>
+          </a:p>
+        </p:txBody>
+      </p:sp>
+    </p:spTree>
+  </p:cSld>
+  <p:clrMapOvr>
+    <a:masterClrMapping/>
+  </p:clrMapOvr>
+</p:notes>
+</file>
+
+<file path=ppt/notesSlides/notesSlide27.xml><?xml version="1.0" encoding="utf-8"?>
+<p:notes xmlns:a="http://schemas.openxmlformats.org/drawingml/2006/main" xmlns:r="http://schemas.openxmlformats.org/officeDocument/2006/relationships" xmlns:p="http://schemas.openxmlformats.org/presentationml/2006/main">
+  <p:cSld>
+    <p:spTree>
+      <p:nvGrpSpPr>
+        <p:cNvPr id="1" name=""/>
+        <p:cNvGrpSpPr/>
+        <p:nvPr/>
+      </p:nvGrpSpPr>
+      <p:grpSpPr>
+        <a:xfrm>
+          <a:off x="0" y="0"/>
+          <a:ext cx="0" cy="0"/>
+          <a:chOff x="0" y="0"/>
+          <a:chExt cx="0" cy="0"/>
+        </a:xfrm>
+      </p:grpSpPr>
+      <p:sp>
+        <p:nvSpPr>
+          <p:cNvPr id="2" name="スライド イメージ プレースホルダ 1"/>
+          <p:cNvSpPr>
+            <a:spLocks noGrp="1" noRot="1" noChangeAspect="1"/>
+          </p:cNvSpPr>
+          <p:nvPr>
+            <p:ph type="sldImg"/>
+          </p:nvPr>
+        </p:nvSpPr>
+        <p:spPr>
+          <a:xfrm>
+            <a:off x="693738" y="685800"/>
+            <a:ext cx="5470525" cy="4103688"/>
+          </a:xfrm>
+        </p:spPr>
+      </p:sp>
+      <p:sp>
+        <p:nvSpPr>
+          <p:cNvPr id="3" name="ノート プレースホルダ 2"/>
+          <p:cNvSpPr>
+            <a:spLocks noGrp="1"/>
+          </p:cNvSpPr>
+          <p:nvPr>
+            <p:ph type="body" idx="1"/>
+          </p:nvPr>
+        </p:nvSpPr>
+        <p:spPr/>
+        <p:txBody>
+          <a:bodyPr>
+            <a:normAutofit/>
+          </a:bodyPr>
+          <a:lstStyle/>
+          <a:p>
+            <a:r>
+              <a:rPr kumimoji="1" lang="ja-JP" altLang="en-US" dirty="0" smtClean="0"/>
+              <a:t>小規模な </a:t>
+            </a:r>
+            <a:r>
+              <a:rPr kumimoji="1" lang="en-US" altLang="ja-JP" dirty="0" err="1" smtClean="0"/>
+              <a:t>grn_hash</a:t>
+            </a:r>
+            <a:r>
+              <a:rPr kumimoji="1" lang="ja-JP" altLang="en-US" dirty="0" smtClean="0"/>
+              <a:t> の構築時間が長くなっている部分は原因がほぼ特定されているので，改良の余地がありそうだという案です．</a:t>
+            </a:r>
+            <a:endParaRPr kumimoji="1" lang="en-US" altLang="ja-JP" dirty="0" smtClean="0"/>
+          </a:p>
+          <a:p>
+            <a:r>
+              <a:rPr kumimoji="1" lang="ja-JP" altLang="en-US" dirty="0" smtClean="0"/>
+              <a:t>検索の途中経過なんかも </a:t>
+            </a:r>
+            <a:r>
+              <a:rPr kumimoji="1" lang="en-US" altLang="ja-JP" dirty="0" err="1" smtClean="0"/>
+              <a:t>grn_hash</a:t>
+            </a:r>
+            <a:r>
+              <a:rPr kumimoji="1" lang="ja-JP" altLang="en-US" dirty="0" smtClean="0"/>
+              <a:t> </a:t>
+            </a:r>
+            <a:r>
+              <a:rPr kumimoji="1" lang="ja-JP" altLang="en-US" dirty="0" err="1" smtClean="0"/>
+              <a:t>に保</a:t>
+            </a:r>
+            <a:r>
+              <a:rPr kumimoji="1" lang="ja-JP" altLang="en-US" dirty="0" smtClean="0"/>
+              <a:t>存しているので，全体的な性能に影響するのではないかと考えています．</a:t>
+            </a:r>
+            <a:endParaRPr kumimoji="1" lang="ja-JP" altLang="en-US" dirty="0"/>
+          </a:p>
+        </p:txBody>
+      </p:sp>
+      <p:sp>
+        <p:nvSpPr>
+          <p:cNvPr id="4" name="スライド番号プレースホルダ 3"/>
+          <p:cNvSpPr>
+            <a:spLocks noGrp="1"/>
+          </p:cNvSpPr>
+          <p:nvPr>
+            <p:ph type="sldNum" sz="quarter" idx="10"/>
+          </p:nvPr>
+        </p:nvSpPr>
+        <p:spPr/>
+        <p:txBody>
+          <a:bodyPr/>
+          <a:lstStyle/>
+          <a:p>
+            <a:fld id="{82B770F3-4A5E-4127-9297-278B18C89B74}" type="slidenum">
+              <a:rPr kumimoji="1" lang="ja-JP" altLang="en-US" smtClean="0"/>
+              <a:pPr/>
+              <a:t>27</a:t>
+            </a:fld>
+            <a:endParaRPr kumimoji="1" lang="ja-JP" altLang="en-US"/>
+          </a:p>
+        </p:txBody>
+      </p:sp>
+    </p:spTree>
+  </p:cSld>
+  <p:clrMapOvr>
+    <a:masterClrMapping/>
+  </p:clrMapOvr>
+</p:notes>
+</file>
+
+<file path=ppt/notesSlides/notesSlide28.xml><?xml version="1.0" encoding="utf-8"?>
+<p:notes xmlns:a="http://schemas.openxmlformats.org/drawingml/2006/main" xmlns:r="http://schemas.openxmlformats.org/officeDocument/2006/relationships" xmlns:p="http://schemas.openxmlformats.org/presentationml/2006/main">
+  <p:cSld>
+    <p:spTree>
+      <p:nvGrpSpPr>
+        <p:cNvPr id="1" name=""/>
+        <p:cNvGrpSpPr/>
+        <p:nvPr/>
+      </p:nvGrpSpPr>
+      <p:grpSpPr>
+        <a:xfrm>
+          <a:off x="0" y="0"/>
+          <a:ext cx="0" cy="0"/>
+          <a:chOff x="0" y="0"/>
+          <a:chExt cx="0" cy="0"/>
+        </a:xfrm>
+      </p:grpSpPr>
+      <p:sp>
+        <p:nvSpPr>
+          <p:cNvPr id="2" name="スライド イメージ プレースホルダ 1"/>
+          <p:cNvSpPr>
+            <a:spLocks noGrp="1" noRot="1" noChangeAspect="1"/>
+          </p:cNvSpPr>
+          <p:nvPr>
+            <p:ph type="sldImg"/>
+          </p:nvPr>
+        </p:nvSpPr>
+        <p:spPr/>
+      </p:sp>
+      <p:sp>
+        <p:nvSpPr>
+          <p:cNvPr id="3" name="ノート プレースホルダ 2"/>
+          <p:cNvSpPr>
+            <a:spLocks noGrp="1"/>
+          </p:cNvSpPr>
+          <p:nvPr>
+            <p:ph type="body" idx="1"/>
+          </p:nvPr>
+        </p:nvSpPr>
+        <p:spPr/>
+        <p:txBody>
+          <a:bodyPr>
+            <a:normAutofit/>
+          </a:bodyPr>
+          <a:lstStyle/>
+          <a:p>
+            <a:endParaRPr kumimoji="1" lang="ja-JP" altLang="en-US"/>
+          </a:p>
+        </p:txBody>
+      </p:sp>
+      <p:sp>
+        <p:nvSpPr>
+          <p:cNvPr id="4" name="スライド番号プレースホルダ 3"/>
+          <p:cNvSpPr>
+            <a:spLocks noGrp="1"/>
+          </p:cNvSpPr>
+          <p:nvPr>
+            <p:ph type="sldNum" sz="quarter" idx="10"/>
+          </p:nvPr>
+        </p:nvSpPr>
+        <p:spPr/>
+        <p:txBody>
+          <a:bodyPr/>
+          <a:lstStyle/>
+          <a:p>
+            <a:fld id="{82B770F3-4A5E-4127-9297-278B18C89B74}" type="slidenum">
+              <a:rPr kumimoji="1" lang="ja-JP" altLang="en-US" smtClean="0"/>
+              <a:pPr/>
+              <a:t>28</a:t>
+            </a:fld>
+            <a:endParaRPr kumimoji="1" lang="ja-JP" altLang="en-US"/>
+          </a:p>
+        </p:txBody>
+      </p:sp>
+    </p:spTree>
+  </p:cSld>
+  <p:clrMapOvr>
+    <a:masterClrMapping/>
+  </p:clrMapOvr>
+</p:notes>
+</file>
+
+<file path=ppt/notesSlides/notesSlide29.xml><?xml version="1.0" encoding="utf-8"?>
+<p:notes xmlns:a="http://schemas.openxmlformats.org/drawingml/2006/main" xmlns:r="http://schemas.openxmlformats.org/officeDocument/2006/relationships" xmlns:p="http://schemas.openxmlformats.org/presentationml/2006/main">
+  <p:cSld>
+    <p:spTree>
+      <p:nvGrpSpPr>
+        <p:cNvPr id="1" name=""/>
+        <p:cNvGrpSpPr/>
+        <p:nvPr/>
+      </p:nvGrpSpPr>
+      <p:grpSpPr>
+        <a:xfrm>
+          <a:off x="0" y="0"/>
+          <a:ext cx="0" cy="0"/>
+          <a:chOff x="0" y="0"/>
+          <a:chExt cx="0" cy="0"/>
+        </a:xfrm>
+      </p:grpSpPr>
+      <p:sp>
+        <p:nvSpPr>
+          <p:cNvPr id="2" name="スライド イメージ プレースホルダ 1"/>
+          <p:cNvSpPr>
+            <a:spLocks noGrp="1" noRot="1" noChangeAspect="1"/>
+          </p:cNvSpPr>
+          <p:nvPr>
+            <p:ph type="sldImg"/>
+          </p:nvPr>
+        </p:nvSpPr>
+        <p:spPr>
+          <a:xfrm>
+            <a:off x="693738" y="685800"/>
+            <a:ext cx="5470525" cy="4103688"/>
+          </a:xfrm>
+        </p:spPr>
+      </p:sp>
+      <p:sp>
+        <p:nvSpPr>
+          <p:cNvPr id="3" name="ノート プレースホルダ 2"/>
+          <p:cNvSpPr>
+            <a:spLocks noGrp="1"/>
+          </p:cNvSpPr>
+          <p:nvPr>
+            <p:ph type="body" idx="1"/>
+          </p:nvPr>
+        </p:nvSpPr>
+        <p:spPr/>
+        <p:txBody>
+          <a:bodyPr>
+            <a:normAutofit/>
+          </a:bodyPr>
+          <a:lstStyle/>
+          <a:p>
+            <a:r>
+              <a:rPr kumimoji="1" lang="ja-JP" altLang="en-US" dirty="0" smtClean="0"/>
+              <a:t>更新不可で参照も遅い代わりに桁違いにコンパクトなデータ構造があるので，それらを上手く利用できれば無駄をなくすことができるのではないかという案です．</a:t>
+            </a:r>
+            <a:endParaRPr kumimoji="1" lang="ja-JP" altLang="en-US" dirty="0"/>
+          </a:p>
+        </p:txBody>
+      </p:sp>
+      <p:sp>
+        <p:nvSpPr>
+          <p:cNvPr id="4" name="スライド番号プレースホルダ 3"/>
+          <p:cNvSpPr>
+            <a:spLocks noGrp="1"/>
+          </p:cNvSpPr>
+          <p:nvPr>
+            <p:ph type="sldNum" sz="quarter" idx="10"/>
+          </p:nvPr>
+        </p:nvSpPr>
+        <p:spPr/>
+        <p:txBody>
+          <a:bodyPr/>
+          <a:lstStyle/>
+          <a:p>
+            <a:fld id="{82B770F3-4A5E-4127-9297-278B18C89B74}" type="slidenum">
+              <a:rPr kumimoji="1" lang="ja-JP" altLang="en-US" smtClean="0"/>
+              <a:pPr/>
+              <a:t>29</a:t>
             </a:fld>
             <a:endParaRPr kumimoji="1" lang="ja-JP" altLang="en-US"/>
           </a:p>
@@ -6816,9 +7345,173 @@
           </a:bodyPr>
           <a:lstStyle/>
           <a:p>
+            <a:endParaRPr kumimoji="1" lang="ja-JP" altLang="en-US" dirty="0"/>
+          </a:p>
+        </p:txBody>
+      </p:sp>
+      <p:sp>
+        <p:nvSpPr>
+          <p:cNvPr id="4" name="スライド番号プレースホルダ 3"/>
+          <p:cNvSpPr>
+            <a:spLocks noGrp="1"/>
+          </p:cNvSpPr>
+          <p:nvPr>
+            <p:ph type="sldNum" sz="quarter" idx="10"/>
+          </p:nvPr>
+        </p:nvSpPr>
+        <p:spPr/>
+        <p:txBody>
+          <a:bodyPr/>
+          <a:lstStyle/>
+          <a:p>
+            <a:fld id="{82B770F3-4A5E-4127-9297-278B18C89B74}" type="slidenum">
+              <a:rPr kumimoji="1" lang="ja-JP" altLang="en-US" smtClean="0"/>
+              <a:pPr/>
+              <a:t>3</a:t>
+            </a:fld>
+            <a:endParaRPr kumimoji="1" lang="ja-JP" altLang="en-US"/>
+          </a:p>
+        </p:txBody>
+      </p:sp>
+    </p:spTree>
+  </p:cSld>
+  <p:clrMapOvr>
+    <a:masterClrMapping/>
+  </p:clrMapOvr>
+</p:notes>
+</file>
+
+<file path=ppt/notesSlides/notesSlide30.xml><?xml version="1.0" encoding="utf-8"?>
+<p:notes xmlns:a="http://schemas.openxmlformats.org/drawingml/2006/main" xmlns:r="http://schemas.openxmlformats.org/officeDocument/2006/relationships" xmlns:p="http://schemas.openxmlformats.org/presentationml/2006/main">
+  <p:cSld>
+    <p:spTree>
+      <p:nvGrpSpPr>
+        <p:cNvPr id="1" name=""/>
+        <p:cNvGrpSpPr/>
+        <p:nvPr/>
+      </p:nvGrpSpPr>
+      <p:grpSpPr>
+        <a:xfrm>
+          <a:off x="0" y="0"/>
+          <a:ext cx="0" cy="0"/>
+          <a:chOff x="0" y="0"/>
+          <a:chExt cx="0" cy="0"/>
+        </a:xfrm>
+      </p:grpSpPr>
+      <p:sp>
+        <p:nvSpPr>
+          <p:cNvPr id="2" name="スライド イメージ プレースホルダ 1"/>
+          <p:cNvSpPr>
+            <a:spLocks noGrp="1" noRot="1" noChangeAspect="1"/>
+          </p:cNvSpPr>
+          <p:nvPr>
+            <p:ph type="sldImg"/>
+          </p:nvPr>
+        </p:nvSpPr>
+        <p:spPr/>
+      </p:sp>
+      <p:sp>
+        <p:nvSpPr>
+          <p:cNvPr id="3" name="ノート プレースホルダ 2"/>
+          <p:cNvSpPr>
+            <a:spLocks noGrp="1"/>
+          </p:cNvSpPr>
+          <p:nvPr>
+            <p:ph type="body" idx="1"/>
+          </p:nvPr>
+        </p:nvSpPr>
+        <p:spPr/>
+        <p:txBody>
+          <a:bodyPr>
+            <a:normAutofit/>
+          </a:bodyPr>
+          <a:lstStyle/>
+          <a:p>
+            <a:endParaRPr kumimoji="1" lang="ja-JP" altLang="en-US"/>
+          </a:p>
+        </p:txBody>
+      </p:sp>
+      <p:sp>
+        <p:nvSpPr>
+          <p:cNvPr id="4" name="スライド番号プレースホルダ 3"/>
+          <p:cNvSpPr>
+            <a:spLocks noGrp="1"/>
+          </p:cNvSpPr>
+          <p:nvPr>
+            <p:ph type="sldNum" sz="quarter" idx="10"/>
+          </p:nvPr>
+        </p:nvSpPr>
+        <p:spPr/>
+        <p:txBody>
+          <a:bodyPr/>
+          <a:lstStyle/>
+          <a:p>
+            <a:fld id="{82B770F3-4A5E-4127-9297-278B18C89B74}" type="slidenum">
+              <a:rPr kumimoji="1" lang="ja-JP" altLang="en-US" smtClean="0"/>
+              <a:pPr/>
+              <a:t>30</a:t>
+            </a:fld>
+            <a:endParaRPr kumimoji="1" lang="ja-JP" altLang="en-US"/>
+          </a:p>
+        </p:txBody>
+      </p:sp>
+    </p:spTree>
+  </p:cSld>
+  <p:clrMapOvr>
+    <a:masterClrMapping/>
+  </p:clrMapOvr>
+</p:notes>
+</file>
+
+<file path=ppt/notesSlides/notesSlide31.xml><?xml version="1.0" encoding="utf-8"?>
+<p:notes xmlns:a="http://schemas.openxmlformats.org/drawingml/2006/main" xmlns:r="http://schemas.openxmlformats.org/officeDocument/2006/relationships" xmlns:p="http://schemas.openxmlformats.org/presentationml/2006/main">
+  <p:cSld>
+    <p:spTree>
+      <p:nvGrpSpPr>
+        <p:cNvPr id="1" name=""/>
+        <p:cNvGrpSpPr/>
+        <p:nvPr/>
+      </p:nvGrpSpPr>
+      <p:grpSpPr>
+        <a:xfrm>
+          <a:off x="0" y="0"/>
+          <a:ext cx="0" cy="0"/>
+          <a:chOff x="0" y="0"/>
+          <a:chExt cx="0" cy="0"/>
+        </a:xfrm>
+      </p:grpSpPr>
+      <p:sp>
+        <p:nvSpPr>
+          <p:cNvPr id="2" name="スライド イメージ プレースホルダ 1"/>
+          <p:cNvSpPr>
+            <a:spLocks noGrp="1" noRot="1" noChangeAspect="1"/>
+          </p:cNvSpPr>
+          <p:nvPr>
+            <p:ph type="sldImg"/>
+          </p:nvPr>
+        </p:nvSpPr>
+        <p:spPr/>
+      </p:sp>
+      <p:sp>
+        <p:nvSpPr>
+          <p:cNvPr id="3" name="ノート プレースホルダ 2"/>
+          <p:cNvSpPr>
+            <a:spLocks noGrp="1"/>
+          </p:cNvSpPr>
+          <p:nvPr>
+            <p:ph type="body" idx="1"/>
+          </p:nvPr>
+        </p:nvSpPr>
+        <p:spPr/>
+        <p:txBody>
+          <a:bodyPr>
+            <a:normAutofit/>
+          </a:bodyPr>
+          <a:lstStyle/>
+          <a:p>
             <a:r>
               <a:rPr kumimoji="1" lang="ja-JP" altLang="en-US" dirty="0" smtClean="0"/>
-              <a:t>ダブル配列というのは </a:t>
+              <a:t>今回は </a:t>
             </a:r>
             <a:r>
               <a:rPr kumimoji="1" lang="en-US" altLang="ja-JP" dirty="0" err="1" smtClean="0"/>
@@ -6826,14 +7519,23 @@
             </a:r>
             <a:r>
               <a:rPr kumimoji="1" lang="ja-JP" altLang="en-US" dirty="0" smtClean="0"/>
-              <a:t> が用いているデータ構造の名称です．</a:t>
-            </a:r>
-            <a:endParaRPr kumimoji="1" lang="en-US" altLang="ja-JP" dirty="0" smtClean="0"/>
-          </a:p>
-          <a:p>
+              <a:t> をメインに持ってきたので，</a:t>
+            </a:r>
+            <a:r>
+              <a:rPr kumimoji="1" lang="en-US" altLang="ja-JP" dirty="0" err="1" smtClean="0"/>
+              <a:t>grn_pat</a:t>
+            </a:r>
+            <a:r>
+              <a:rPr kumimoji="1" lang="en-US" altLang="ja-JP" dirty="0" smtClean="0"/>
+              <a:t>/hash/</a:t>
+            </a:r>
+            <a:r>
+              <a:rPr kumimoji="1" lang="en-US" altLang="ja-JP" dirty="0" err="1" smtClean="0"/>
+              <a:t>dat</a:t>
+            </a:r>
             <a:r>
               <a:rPr kumimoji="1" lang="ja-JP" altLang="en-US" dirty="0" smtClean="0"/>
-              <a:t>一部でカルト的な人気を誇っているかもしれません．</a:t>
+              <a:t> に関する内容に絞りました．</a:t>
             </a:r>
             <a:endParaRPr kumimoji="1" lang="ja-JP" altLang="en-US" dirty="0"/>
           </a:p>
@@ -6857,7 +7559,89 @@
             <a:fld id="{82B770F3-4A5E-4127-9297-278B18C89B74}" type="slidenum">
               <a:rPr kumimoji="1" lang="ja-JP" altLang="en-US" smtClean="0"/>
               <a:pPr/>
-              <a:t>4</a:t>
+              <a:t>31</a:t>
+            </a:fld>
+            <a:endParaRPr kumimoji="1" lang="ja-JP" altLang="en-US"/>
+          </a:p>
+        </p:txBody>
+      </p:sp>
+    </p:spTree>
+  </p:cSld>
+  <p:clrMapOvr>
+    <a:masterClrMapping/>
+  </p:clrMapOvr>
+</p:notes>
+</file>
+
+<file path=ppt/notesSlides/notesSlide32.xml><?xml version="1.0" encoding="utf-8"?>
+<p:notes xmlns:a="http://schemas.openxmlformats.org/drawingml/2006/main" xmlns:r="http://schemas.openxmlformats.org/officeDocument/2006/relationships" xmlns:p="http://schemas.openxmlformats.org/presentationml/2006/main">
+  <p:cSld>
+    <p:spTree>
+      <p:nvGrpSpPr>
+        <p:cNvPr id="1" name=""/>
+        <p:cNvGrpSpPr/>
+        <p:nvPr/>
+      </p:nvGrpSpPr>
+      <p:grpSpPr>
+        <a:xfrm>
+          <a:off x="0" y="0"/>
+          <a:ext cx="0" cy="0"/>
+          <a:chOff x="0" y="0"/>
+          <a:chExt cx="0" cy="0"/>
+        </a:xfrm>
+      </p:grpSpPr>
+      <p:sp>
+        <p:nvSpPr>
+          <p:cNvPr id="2" name="スライド イメージ プレースホルダ 1"/>
+          <p:cNvSpPr>
+            <a:spLocks noGrp="1" noRot="1" noChangeAspect="1"/>
+          </p:cNvSpPr>
+          <p:nvPr>
+            <p:ph type="sldImg"/>
+          </p:nvPr>
+        </p:nvSpPr>
+        <p:spPr/>
+      </p:sp>
+      <p:sp>
+        <p:nvSpPr>
+          <p:cNvPr id="3" name="ノート プレースホルダ 2"/>
+          <p:cNvSpPr>
+            <a:spLocks noGrp="1"/>
+          </p:cNvSpPr>
+          <p:nvPr>
+            <p:ph type="body" idx="1"/>
+          </p:nvPr>
+        </p:nvSpPr>
+        <p:spPr/>
+        <p:txBody>
+          <a:bodyPr>
+            <a:normAutofit/>
+          </a:bodyPr>
+          <a:lstStyle/>
+          <a:p>
+            <a:endParaRPr kumimoji="1" lang="ja-JP" altLang="en-US" dirty="0"/>
+          </a:p>
+        </p:txBody>
+      </p:sp>
+      <p:sp>
+        <p:nvSpPr>
+          <p:cNvPr id="4" name="スライド番号プレースホルダ 3"/>
+          <p:cNvSpPr>
+            <a:spLocks noGrp="1"/>
+          </p:cNvSpPr>
+          <p:nvPr>
+            <p:ph type="sldNum" sz="quarter" idx="10"/>
+          </p:nvPr>
+        </p:nvSpPr>
+        <p:spPr/>
+        <p:txBody>
+          <a:bodyPr/>
+          <a:lstStyle/>
+          <a:p>
+            <a:fld id="{82B770F3-4A5E-4127-9297-278B18C89B74}" type="slidenum">
+              <a:rPr kumimoji="1" lang="ja-JP" altLang="en-US" smtClean="0"/>
+              <a:pPr/>
+              <a:t>32</a:t>
             </a:fld>
             <a:endParaRPr kumimoji="1" lang="ja-JP" altLang="en-US"/>
           </a:p>
@@ -6919,24 +7703,24 @@
           <a:p>
             <a:r>
               <a:rPr kumimoji="1" lang="ja-JP" altLang="en-US" dirty="0" smtClean="0"/>
-              <a:t>基本的な機能は文字列に </a:t>
-            </a:r>
-            <a:r>
-              <a:rPr kumimoji="1" lang="en-US" altLang="ja-JP" dirty="0" smtClean="0"/>
-              <a:t>ID</a:t>
+              <a:t>ダブル配列というのは </a:t>
+            </a:r>
+            <a:r>
+              <a:rPr kumimoji="1" lang="en-US" altLang="ja-JP" dirty="0" err="1" smtClean="0"/>
+              <a:t>grn_dat</a:t>
             </a:r>
             <a:r>
               <a:rPr kumimoji="1" lang="ja-JP" altLang="en-US" dirty="0" smtClean="0"/>
-              <a:t> を割り当てるというものですが，重要なのは </a:t>
-            </a:r>
-            <a:r>
-              <a:rPr kumimoji="1" lang="en-US" altLang="ja-JP" dirty="0" smtClean="0"/>
-              <a:t>ID</a:t>
-            </a:r>
+              <a:t> が用いているデータ構造の名称です．</a:t>
+            </a:r>
+            <a:endParaRPr kumimoji="1" lang="en-US" altLang="ja-JP" dirty="0" smtClean="0"/>
+          </a:p>
+          <a:p>
             <a:r>
               <a:rPr kumimoji="1" lang="ja-JP" altLang="en-US" dirty="0" smtClean="0"/>
-              <a:t> と文字列で相互に参照できることです．</a:t>
-            </a:r>
+              <a:t>一部でカルト的な人気を誇っているかもしれません．</a:t>
+            </a:r>
+            <a:endParaRPr kumimoji="1" lang="ja-JP" altLang="en-US" dirty="0"/>
           </a:p>
         </p:txBody>
       </p:sp>
@@ -6958,7 +7742,7 @@
             <a:fld id="{82B770F3-4A5E-4127-9297-278B18C89B74}" type="slidenum">
               <a:rPr kumimoji="1" lang="ja-JP" altLang="en-US" smtClean="0"/>
               <a:pPr/>
-              <a:t>6</a:t>
+              <a:t>4</a:t>
             </a:fld>
             <a:endParaRPr kumimoji="1" lang="ja-JP" altLang="en-US"/>
           </a:p>
@@ -7018,45 +7802,7 @@
           </a:bodyPr>
           <a:lstStyle/>
           <a:p>
-            <a:r>
-              <a:rPr kumimoji="1" lang="en-US" altLang="ja-JP" dirty="0" err="1" smtClean="0"/>
-              <a:t>grn_pat</a:t>
-            </a:r>
-            <a:r>
-              <a:rPr kumimoji="1" lang="ja-JP" altLang="en-US" dirty="0" smtClean="0"/>
-              <a:t> と </a:t>
-            </a:r>
-            <a:r>
-              <a:rPr kumimoji="1" lang="en-US" altLang="ja-JP" dirty="0" err="1" smtClean="0"/>
-              <a:t>grn_dat</a:t>
-            </a:r>
-            <a:r>
-              <a:rPr kumimoji="1" lang="ja-JP" altLang="en-US" dirty="0" smtClean="0"/>
-              <a:t> が前方一致検索をサポートできるのは，どちらもトライの仲間だからです．</a:t>
-            </a:r>
-            <a:endParaRPr kumimoji="1" lang="en-US" altLang="ja-JP" dirty="0" smtClean="0"/>
-          </a:p>
-          <a:p>
-            <a:r>
-              <a:rPr kumimoji="1" lang="ja-JP" altLang="en-US" dirty="0" smtClean="0"/>
-              <a:t>ちなみに </a:t>
-            </a:r>
-            <a:r>
-              <a:rPr kumimoji="1" lang="en-US" altLang="ja-JP" dirty="0" err="1" smtClean="0"/>
-              <a:t>grn_dat</a:t>
-            </a:r>
-            <a:r>
-              <a:rPr kumimoji="1" lang="ja-JP" altLang="en-US" dirty="0" smtClean="0"/>
-              <a:t> の「高速」は参照に対する評価です．</a:t>
-            </a:r>
-            <a:endParaRPr kumimoji="1" lang="en-US" altLang="ja-JP" dirty="0" smtClean="0"/>
-          </a:p>
-          <a:p>
-            <a:r>
-              <a:rPr kumimoji="1" lang="ja-JP" altLang="en-US" dirty="0" smtClean="0"/>
-              <a:t>単純な追加・検索については，ハッシュ表がもっとも優秀です．</a:t>
-            </a:r>
-            <a:endParaRPr kumimoji="1" lang="en-US" altLang="ja-JP" dirty="0" smtClean="0"/>
+            <a:endParaRPr kumimoji="1" lang="ja-JP" altLang="en-US"/>
           </a:p>
         </p:txBody>
       </p:sp>
@@ -7078,7 +7824,7 @@
             <a:fld id="{82B770F3-4A5E-4127-9297-278B18C89B74}" type="slidenum">
               <a:rPr kumimoji="1" lang="ja-JP" altLang="en-US" smtClean="0"/>
               <a:pPr/>
-              <a:t>7</a:t>
+              <a:t>5</a:t>
             </a:fld>
             <a:endParaRPr kumimoji="1" lang="ja-JP" altLang="en-US"/>
           </a:p>
@@ -7139,38 +7885,25 @@
           <a:lstStyle/>
           <a:p>
             <a:r>
-              <a:rPr kumimoji="1" lang="en-US" altLang="ja-JP" dirty="0" err="1" smtClean="0"/>
-              <a:t>groonga</a:t>
-            </a:r>
-            <a:r>
               <a:rPr kumimoji="1" lang="ja-JP" altLang="en-US" dirty="0" smtClean="0"/>
-              <a:t> といえば参照ロックフリーということで，</a:t>
-            </a:r>
-            <a:r>
-              <a:rPr kumimoji="1" lang="en-US" altLang="ja-JP" dirty="0" err="1" smtClean="0"/>
-              <a:t>groonga</a:t>
-            </a:r>
-            <a:r>
-              <a:rPr kumimoji="1" lang="ja-JP" altLang="en-US" baseline="0" dirty="0" smtClean="0"/>
-              <a:t> のコアである </a:t>
-            </a:r>
-            <a:r>
-              <a:rPr kumimoji="1" lang="en-US" altLang="ja-JP" baseline="0" dirty="0" err="1" smtClean="0"/>
-              <a:t>grn_pat</a:t>
-            </a:r>
-            <a:r>
-              <a:rPr kumimoji="1" lang="en-US" altLang="ja-JP" baseline="0" dirty="0" smtClean="0"/>
-              <a:t>/hash/</a:t>
-            </a:r>
-            <a:r>
-              <a:rPr kumimoji="1" lang="en-US" altLang="ja-JP" baseline="0" dirty="0" err="1" smtClean="0"/>
-              <a:t>dat</a:t>
-            </a:r>
-            <a:r>
-              <a:rPr kumimoji="1" lang="ja-JP" altLang="en-US" baseline="0" dirty="0" smtClean="0"/>
-              <a:t> はいずれも参照ロックフリーな実装になっています．</a:t>
-            </a:r>
-            <a:endParaRPr kumimoji="1" lang="ja-JP" altLang="en-US" dirty="0"/>
+              <a:t>基本的な機能は文字列に </a:t>
+            </a:r>
+            <a:r>
+              <a:rPr kumimoji="1" lang="en-US" altLang="ja-JP" dirty="0" smtClean="0"/>
+              <a:t>ID</a:t>
+            </a:r>
+            <a:r>
+              <a:rPr kumimoji="1" lang="ja-JP" altLang="en-US" dirty="0" smtClean="0"/>
+              <a:t> を割り当てるというものですが，重要なのは </a:t>
+            </a:r>
+            <a:r>
+              <a:rPr kumimoji="1" lang="en-US" altLang="ja-JP" dirty="0" smtClean="0"/>
+              <a:t>ID</a:t>
+            </a:r>
+            <a:r>
+              <a:rPr kumimoji="1" lang="ja-JP" altLang="en-US" dirty="0" smtClean="0"/>
+              <a:t> と文字列で相互に参照できることです．</a:t>
+            </a:r>
           </a:p>
         </p:txBody>
       </p:sp>
@@ -7192,7 +7925,7 @@
             <a:fld id="{82B770F3-4A5E-4127-9297-278B18C89B74}" type="slidenum">
               <a:rPr kumimoji="1" lang="ja-JP" altLang="en-US" smtClean="0"/>
               <a:pPr/>
-              <a:t>8</a:t>
+              <a:t>6</a:t>
             </a:fld>
             <a:endParaRPr kumimoji="1" lang="ja-JP" altLang="en-US"/>
           </a:p>
@@ -7253,28 +7986,44 @@
           <a:lstStyle/>
           <a:p>
             <a:r>
+              <a:rPr kumimoji="1" lang="en-US" altLang="ja-JP" dirty="0" err="1" smtClean="0"/>
+              <a:t>grn_pat</a:t>
+            </a:r>
+            <a:r>
               <a:rPr kumimoji="1" lang="ja-JP" altLang="en-US" dirty="0" smtClean="0"/>
-              <a:t>それぞれの特徴をまとめた表になっています．</a:t>
-            </a:r>
-            <a:endParaRPr kumimoji="1" lang="en-US" altLang="ja-JP" dirty="0" smtClean="0"/>
-          </a:p>
-          <a:p>
+              <a:t> と </a:t>
+            </a:r>
             <a:r>
               <a:rPr kumimoji="1" lang="en-US" altLang="ja-JP" dirty="0" err="1" smtClean="0"/>
               <a:t>grn_dat</a:t>
             </a:r>
             <a:r>
               <a:rPr kumimoji="1" lang="ja-JP" altLang="en-US" dirty="0" smtClean="0"/>
-              <a:t> は参照が速い代わりに更新が遅くてサイズが大きいので，速度面で困ったとき，あるいは困ることが予想されるときに利用を検討すれば良いと思います．</a:t>
+              <a:t> が前方一致検索をサポートできるのは，どちらもトライの仲間だからです．</a:t>
             </a:r>
             <a:endParaRPr kumimoji="1" lang="en-US" altLang="ja-JP" dirty="0" smtClean="0"/>
           </a:p>
           <a:p>
             <a:r>
               <a:rPr kumimoji="1" lang="ja-JP" altLang="en-US" dirty="0" smtClean="0"/>
-              <a:t>文字列更新はテーブル・カラムをリネームしたいという要望から生まれた機能です．ダブル配列だから可能というものではありません．</a:t>
-            </a:r>
-            <a:endParaRPr kumimoji="1" lang="ja-JP" altLang="en-US" dirty="0"/>
+              <a:t>ちなみに </a:t>
+            </a:r>
+            <a:r>
+              <a:rPr kumimoji="1" lang="en-US" altLang="ja-JP" dirty="0" err="1" smtClean="0"/>
+              <a:t>grn_dat</a:t>
+            </a:r>
+            <a:r>
+              <a:rPr kumimoji="1" lang="ja-JP" altLang="en-US" dirty="0" smtClean="0"/>
+              <a:t> の「高速」は参照に対する評価です．</a:t>
+            </a:r>
+            <a:endParaRPr kumimoji="1" lang="en-US" altLang="ja-JP" dirty="0" smtClean="0"/>
+          </a:p>
+          <a:p>
+            <a:r>
+              <a:rPr kumimoji="1" lang="ja-JP" altLang="en-US" dirty="0" smtClean="0"/>
+              <a:t>単純な追加・検索については，ハッシュ表がもっとも優秀です．</a:t>
+            </a:r>
+            <a:endParaRPr kumimoji="1" lang="en-US" altLang="ja-JP" dirty="0" smtClean="0"/>
           </a:p>
         </p:txBody>
       </p:sp>
@@ -7296,7 +8045,7 @@
             <a:fld id="{82B770F3-4A5E-4127-9297-278B18C89B74}" type="slidenum">
               <a:rPr kumimoji="1" lang="ja-JP" altLang="en-US" smtClean="0"/>
               <a:pPr/>
-              <a:t>9</a:t>
+              <a:t>7</a:t>
             </a:fld>
             <a:endParaRPr kumimoji="1" lang="ja-JP" altLang="en-US"/>
           </a:p>
@@ -7357,26 +8106,38 @@
           <a:lstStyle/>
           <a:p>
             <a:r>
+              <a:rPr kumimoji="1" lang="en-US" altLang="ja-JP" dirty="0" err="1" smtClean="0"/>
+              <a:t>groonga</a:t>
+            </a:r>
+            <a:r>
               <a:rPr kumimoji="1" lang="ja-JP" altLang="en-US" dirty="0" smtClean="0"/>
-              <a:t>今回の発表では，説明を簡単にする目的で，</a:t>
-            </a:r>
-            <a:r>
-              <a:rPr kumimoji="1" lang="en-US" altLang="ja-JP" dirty="0" smtClean="0"/>
-              <a:t>Common Prefix Search </a:t>
-            </a:r>
-            <a:r>
-              <a:rPr kumimoji="1" lang="ja-JP" altLang="en-US" dirty="0" smtClean="0"/>
-              <a:t>と </a:t>
-            </a:r>
-            <a:r>
-              <a:rPr kumimoji="1" lang="en-US" altLang="ja-JP" dirty="0" smtClean="0"/>
-              <a:t>Predictive Search</a:t>
-            </a:r>
-            <a:r>
-              <a:rPr kumimoji="1" lang="ja-JP" altLang="en-US" dirty="0" smtClean="0"/>
-              <a:t> をまとめて前方一致検索ということにしました．</a:t>
-            </a:r>
-            <a:endParaRPr kumimoji="1" lang="en-US" altLang="ja-JP" dirty="0" smtClean="0"/>
+              <a:t> といえば参照ロックフリーということで，</a:t>
+            </a:r>
+            <a:r>
+              <a:rPr kumimoji="1" lang="en-US" altLang="ja-JP" dirty="0" err="1" smtClean="0"/>
+              <a:t>groonga</a:t>
+            </a:r>
+            <a:r>
+              <a:rPr kumimoji="1" lang="ja-JP" altLang="en-US" baseline="0" dirty="0" smtClean="0"/>
+              <a:t> のコアである </a:t>
+            </a:r>
+            <a:r>
+              <a:rPr kumimoji="1" lang="en-US" altLang="ja-JP" baseline="0" dirty="0" err="1" smtClean="0"/>
+              <a:t>grn_pat</a:t>
+            </a:r>
+            <a:r>
+              <a:rPr kumimoji="1" lang="en-US" altLang="ja-JP" baseline="0" dirty="0" smtClean="0"/>
+              <a:t>/hash/</a:t>
+            </a:r>
+            <a:r>
+              <a:rPr kumimoji="1" lang="en-US" altLang="ja-JP" baseline="0" dirty="0" err="1" smtClean="0"/>
+              <a:t>dat</a:t>
+            </a:r>
+            <a:r>
+              <a:rPr kumimoji="1" lang="ja-JP" altLang="en-US" baseline="0" dirty="0" smtClean="0"/>
+              <a:t> はいずれも参照ロックフリーな実装になっています．</a:t>
+            </a:r>
+            <a:endParaRPr kumimoji="1" lang="ja-JP" altLang="en-US" dirty="0"/>
           </a:p>
         </p:txBody>
       </p:sp>
@@ -7398,7 +8159,7 @@
             <a:fld id="{82B770F3-4A5E-4127-9297-278B18C89B74}" type="slidenum">
               <a:rPr kumimoji="1" lang="ja-JP" altLang="en-US" smtClean="0"/>
               <a:pPr/>
-              <a:t>10</a:t>
+              <a:t>8</a:t>
             </a:fld>
             <a:endParaRPr kumimoji="1" lang="ja-JP" altLang="en-US"/>
           </a:p>
@@ -7460,7 +8221,25 @@
           <a:p>
             <a:r>
               <a:rPr kumimoji="1" lang="ja-JP" altLang="en-US" dirty="0" smtClean="0"/>
-              <a:t>文字列を差し替えるだけの単純な機能ですが，これのおかげでテーブルやカラムの名前変更が可能になりました．</a:t>
+              <a:t>それぞれの特徴をまとめた表になっています．</a:t>
+            </a:r>
+            <a:endParaRPr kumimoji="1" lang="en-US" altLang="ja-JP" dirty="0" smtClean="0"/>
+          </a:p>
+          <a:p>
+            <a:r>
+              <a:rPr kumimoji="1" lang="en-US" altLang="ja-JP" dirty="0" err="1" smtClean="0"/>
+              <a:t>grn_dat</a:t>
+            </a:r>
+            <a:r>
+              <a:rPr kumimoji="1" lang="ja-JP" altLang="en-US" dirty="0" smtClean="0"/>
+              <a:t> は参照が速い代わりに更新が遅くてサイズが大きいので，速度面で困ったとき，あるいは困ることが予想されるときに利用を検討すれば良いと思います．</a:t>
+            </a:r>
+            <a:endParaRPr kumimoji="1" lang="en-US" altLang="ja-JP" dirty="0" smtClean="0"/>
+          </a:p>
+          <a:p>
+            <a:r>
+              <a:rPr kumimoji="1" lang="ja-JP" altLang="en-US" dirty="0" smtClean="0"/>
+              <a:t>文字列更新はテーブル・カラムをリネームしたいという要望から生まれた機能です．ダブル配列だから可能というものではありません．</a:t>
             </a:r>
             <a:endParaRPr kumimoji="1" lang="ja-JP" altLang="en-US" dirty="0"/>
           </a:p>
@@ -7484,7 +8263,7 @@
             <a:fld id="{82B770F3-4A5E-4127-9297-278B18C89B74}" type="slidenum">
               <a:rPr kumimoji="1" lang="ja-JP" altLang="en-US" smtClean="0"/>
               <a:pPr/>
-              <a:t>11</a:t>
+              <a:t>9</a:t>
             </a:fld>
             <a:endParaRPr kumimoji="1" lang="ja-JP" altLang="en-US"/>
           </a:p>
@@ -16035,7 +16814,7 @@
             </a:br>
             <a:r>
               <a:rPr lang="en-US" altLang="ja-JP" sz="2400" dirty="0" smtClean="0">
-                <a:hlinkClick r:id="rId2"/>
+                <a:hlinkClick r:id="rId3"/>
               </a:rPr>
               <a:t> http://code.google.com/p/marisa-trie/</a:t>
             </a:r>

</xml_diff>